<commit_message>
docs : git branch 문서 보강
- 원격 저장소에 존재하는 브랜치 기반으로 브랜치 생성하는 법 추가

(cherry picked from commit 56abf498f3792f47c381ced53d19ef4fa7652edd)
</commit_message>
<xml_diff>
--- a/docs/3. git branch.pptx
+++ b/docs/3. git branch.pptx
@@ -5,7 +5,7 @@
     <p:sldMasterId id="2147483648" r:id="rId1"/>
   </p:sldMasterIdLst>
   <p:notesMasterIdLst>
-    <p:notesMasterId r:id="rId50"/>
+    <p:notesMasterId r:id="rId51"/>
   </p:notesMasterIdLst>
   <p:sldIdLst>
     <p:sldId id="257" r:id="rId2"/>
@@ -30,32 +30,33 @@
     <p:sldId id="283" r:id="rId21"/>
     <p:sldId id="284" r:id="rId22"/>
     <p:sldId id="294" r:id="rId23"/>
-    <p:sldId id="275" r:id="rId24"/>
-    <p:sldId id="286" r:id="rId25"/>
-    <p:sldId id="287" r:id="rId26"/>
-    <p:sldId id="288" r:id="rId27"/>
-    <p:sldId id="291" r:id="rId28"/>
-    <p:sldId id="289" r:id="rId29"/>
-    <p:sldId id="292" r:id="rId30"/>
-    <p:sldId id="293" r:id="rId31"/>
-    <p:sldId id="290" r:id="rId32"/>
-    <p:sldId id="285" r:id="rId33"/>
-    <p:sldId id="295" r:id="rId34"/>
-    <p:sldId id="296" r:id="rId35"/>
-    <p:sldId id="297" r:id="rId36"/>
-    <p:sldId id="298" r:id="rId37"/>
-    <p:sldId id="299" r:id="rId38"/>
-    <p:sldId id="300" r:id="rId39"/>
-    <p:sldId id="302" r:id="rId40"/>
-    <p:sldId id="304" r:id="rId41"/>
-    <p:sldId id="305" r:id="rId42"/>
-    <p:sldId id="306" r:id="rId43"/>
-    <p:sldId id="307" r:id="rId44"/>
-    <p:sldId id="308" r:id="rId45"/>
-    <p:sldId id="309" r:id="rId46"/>
-    <p:sldId id="310" r:id="rId47"/>
-    <p:sldId id="260" r:id="rId48"/>
-    <p:sldId id="262" r:id="rId49"/>
+    <p:sldId id="315" r:id="rId24"/>
+    <p:sldId id="275" r:id="rId25"/>
+    <p:sldId id="286" r:id="rId26"/>
+    <p:sldId id="287" r:id="rId27"/>
+    <p:sldId id="288" r:id="rId28"/>
+    <p:sldId id="291" r:id="rId29"/>
+    <p:sldId id="289" r:id="rId30"/>
+    <p:sldId id="292" r:id="rId31"/>
+    <p:sldId id="293" r:id="rId32"/>
+    <p:sldId id="290" r:id="rId33"/>
+    <p:sldId id="285" r:id="rId34"/>
+    <p:sldId id="295" r:id="rId35"/>
+    <p:sldId id="296" r:id="rId36"/>
+    <p:sldId id="297" r:id="rId37"/>
+    <p:sldId id="298" r:id="rId38"/>
+    <p:sldId id="299" r:id="rId39"/>
+    <p:sldId id="300" r:id="rId40"/>
+    <p:sldId id="302" r:id="rId41"/>
+    <p:sldId id="304" r:id="rId42"/>
+    <p:sldId id="305" r:id="rId43"/>
+    <p:sldId id="306" r:id="rId44"/>
+    <p:sldId id="307" r:id="rId45"/>
+    <p:sldId id="308" r:id="rId46"/>
+    <p:sldId id="309" r:id="rId47"/>
+    <p:sldId id="310" r:id="rId48"/>
+    <p:sldId id="260" r:id="rId49"/>
+    <p:sldId id="262" r:id="rId50"/>
   </p:sldIdLst>
   <p:sldSz cx="12192000" cy="6858000"/>
   <p:notesSz cx="6858000" cy="9144000"/>
@@ -1495,7 +1496,7 @@
           <a:p>
             <a:fld id="{EFBA5509-D1D1-47CF-BFB7-E1AA9548D41D}" type="datetimeFigureOut">
               <a:rPr lang="ko-KR" altLang="en-US" smtClean="0"/>
-              <a:t>2022-11-26</a:t>
+              <a:t>2023-01-05</a:t>
             </a:fld>
             <a:endParaRPr lang="ko-KR" altLang="en-US"/>
           </a:p>
@@ -2518,6 +2519,90 @@
 </p:notes>
 </file>
 
+<file path=ppt/notesSlides/notesSlide18.xml><?xml version="1.0" encoding="utf-8"?>
+<p:notes xmlns:a="http://schemas.openxmlformats.org/drawingml/2006/main" xmlns:r="http://schemas.openxmlformats.org/officeDocument/2006/relationships" xmlns:p="http://schemas.openxmlformats.org/presentationml/2006/main">
+  <p:cSld>
+    <p:spTree>
+      <p:nvGrpSpPr>
+        <p:cNvPr id="1" name=""/>
+        <p:cNvGrpSpPr/>
+        <p:nvPr/>
+      </p:nvGrpSpPr>
+      <p:grpSpPr>
+        <a:xfrm>
+          <a:off x="0" y="0"/>
+          <a:ext cx="0" cy="0"/>
+          <a:chOff x="0" y="0"/>
+          <a:chExt cx="0" cy="0"/>
+        </a:xfrm>
+      </p:grpSpPr>
+      <p:sp>
+        <p:nvSpPr>
+          <p:cNvPr id="2" name="슬라이드 이미지 개체 틀 1"/>
+          <p:cNvSpPr>
+            <a:spLocks noGrp="1" noRot="1" noChangeAspect="1"/>
+          </p:cNvSpPr>
+          <p:nvPr>
+            <p:ph type="sldImg"/>
+          </p:nvPr>
+        </p:nvSpPr>
+        <p:spPr/>
+      </p:sp>
+      <p:sp>
+        <p:nvSpPr>
+          <p:cNvPr id="3" name="슬라이드 노트 개체 틀 2"/>
+          <p:cNvSpPr>
+            <a:spLocks noGrp="1"/>
+          </p:cNvSpPr>
+          <p:nvPr>
+            <p:ph type="body" idx="1"/>
+          </p:nvPr>
+        </p:nvSpPr>
+        <p:spPr/>
+        <p:txBody>
+          <a:bodyPr/>
+          <a:lstStyle/>
+          <a:p>
+            <a:endParaRPr lang="ko-KR" altLang="en-US" dirty="0"/>
+          </a:p>
+        </p:txBody>
+      </p:sp>
+      <p:sp>
+        <p:nvSpPr>
+          <p:cNvPr id="4" name="슬라이드 번호 개체 틀 3"/>
+          <p:cNvSpPr>
+            <a:spLocks noGrp="1"/>
+          </p:cNvSpPr>
+          <p:nvPr>
+            <p:ph type="sldNum" sz="quarter" idx="5"/>
+          </p:nvPr>
+        </p:nvSpPr>
+        <p:spPr/>
+        <p:txBody>
+          <a:bodyPr/>
+          <a:lstStyle/>
+          <a:p>
+            <a:fld id="{145D4F75-7E5F-419D-AB03-9C193CB4F170}" type="slidenum">
+              <a:rPr lang="ko-KR" altLang="en-US" smtClean="0"/>
+              <a:t>23</a:t>
+            </a:fld>
+            <a:endParaRPr lang="ko-KR" altLang="en-US"/>
+          </a:p>
+        </p:txBody>
+      </p:sp>
+    </p:spTree>
+    <p:extLst>
+      <p:ext uri="{BB962C8B-B14F-4D97-AF65-F5344CB8AC3E}">
+        <p14:creationId xmlns:p14="http://schemas.microsoft.com/office/powerpoint/2010/main" val="3256964959"/>
+      </p:ext>
+    </p:extLst>
+  </p:cSld>
+  <p:clrMapOvr>
+    <a:masterClrMapping/>
+  </p:clrMapOvr>
+</p:notes>
+</file>
+
 <file path=ppt/notesSlides/notesSlide2.xml><?xml version="1.0" encoding="utf-8"?>
 <p:notes xmlns:a="http://schemas.openxmlformats.org/drawingml/2006/main" xmlns:r="http://schemas.openxmlformats.org/officeDocument/2006/relationships" xmlns:p="http://schemas.openxmlformats.org/presentationml/2006/main">
   <p:cSld>
@@ -3337,7 +3422,7 @@
           <a:p>
             <a:fld id="{2E2D5BC7-3CC9-4CF8-9043-E85E9F2EC4FF}" type="datetimeFigureOut">
               <a:rPr lang="ko-KR" altLang="en-US" smtClean="0"/>
-              <a:t>2022-11-26</a:t>
+              <a:t>2023-01-05</a:t>
             </a:fld>
             <a:endParaRPr lang="ko-KR" altLang="en-US"/>
           </a:p>
@@ -3535,7 +3620,7 @@
           <a:p>
             <a:fld id="{2E2D5BC7-3CC9-4CF8-9043-E85E9F2EC4FF}" type="datetimeFigureOut">
               <a:rPr lang="ko-KR" altLang="en-US" smtClean="0"/>
-              <a:t>2022-11-26</a:t>
+              <a:t>2023-01-05</a:t>
             </a:fld>
             <a:endParaRPr lang="ko-KR" altLang="en-US"/>
           </a:p>
@@ -3743,7 +3828,7 @@
           <a:p>
             <a:fld id="{2E2D5BC7-3CC9-4CF8-9043-E85E9F2EC4FF}" type="datetimeFigureOut">
               <a:rPr lang="ko-KR" altLang="en-US" smtClean="0"/>
-              <a:t>2022-11-26</a:t>
+              <a:t>2023-01-05</a:t>
             </a:fld>
             <a:endParaRPr lang="ko-KR" altLang="en-US"/>
           </a:p>
@@ -3941,7 +4026,7 @@
           <a:p>
             <a:fld id="{2E2D5BC7-3CC9-4CF8-9043-E85E9F2EC4FF}" type="datetimeFigureOut">
               <a:rPr lang="ko-KR" altLang="en-US" smtClean="0"/>
-              <a:t>2022-11-26</a:t>
+              <a:t>2023-01-05</a:t>
             </a:fld>
             <a:endParaRPr lang="ko-KR" altLang="en-US"/>
           </a:p>
@@ -4216,7 +4301,7 @@
           <a:p>
             <a:fld id="{2E2D5BC7-3CC9-4CF8-9043-E85E9F2EC4FF}" type="datetimeFigureOut">
               <a:rPr lang="ko-KR" altLang="en-US" smtClean="0"/>
-              <a:t>2022-11-26</a:t>
+              <a:t>2023-01-05</a:t>
             </a:fld>
             <a:endParaRPr lang="ko-KR" altLang="en-US"/>
           </a:p>
@@ -4481,7 +4566,7 @@
           <a:p>
             <a:fld id="{2E2D5BC7-3CC9-4CF8-9043-E85E9F2EC4FF}" type="datetimeFigureOut">
               <a:rPr lang="ko-KR" altLang="en-US" smtClean="0"/>
-              <a:t>2022-11-26</a:t>
+              <a:t>2023-01-05</a:t>
             </a:fld>
             <a:endParaRPr lang="ko-KR" altLang="en-US"/>
           </a:p>
@@ -4893,7 +4978,7 @@
           <a:p>
             <a:fld id="{2E2D5BC7-3CC9-4CF8-9043-E85E9F2EC4FF}" type="datetimeFigureOut">
               <a:rPr lang="ko-KR" altLang="en-US" smtClean="0"/>
-              <a:t>2022-11-26</a:t>
+              <a:t>2023-01-05</a:t>
             </a:fld>
             <a:endParaRPr lang="ko-KR" altLang="en-US"/>
           </a:p>
@@ -5034,7 +5119,7 @@
           <a:p>
             <a:fld id="{2E2D5BC7-3CC9-4CF8-9043-E85E9F2EC4FF}" type="datetimeFigureOut">
               <a:rPr lang="ko-KR" altLang="en-US" smtClean="0"/>
-              <a:t>2022-11-26</a:t>
+              <a:t>2023-01-05</a:t>
             </a:fld>
             <a:endParaRPr lang="ko-KR" altLang="en-US"/>
           </a:p>
@@ -5147,7 +5232,7 @@
           <a:p>
             <a:fld id="{2E2D5BC7-3CC9-4CF8-9043-E85E9F2EC4FF}" type="datetimeFigureOut">
               <a:rPr lang="ko-KR" altLang="en-US" smtClean="0"/>
-              <a:t>2022-11-26</a:t>
+              <a:t>2023-01-05</a:t>
             </a:fld>
             <a:endParaRPr lang="ko-KR" altLang="en-US"/>
           </a:p>
@@ -5458,7 +5543,7 @@
           <a:p>
             <a:fld id="{2E2D5BC7-3CC9-4CF8-9043-E85E9F2EC4FF}" type="datetimeFigureOut">
               <a:rPr lang="ko-KR" altLang="en-US" smtClean="0"/>
-              <a:t>2022-11-26</a:t>
+              <a:t>2023-01-05</a:t>
             </a:fld>
             <a:endParaRPr lang="ko-KR" altLang="en-US"/>
           </a:p>
@@ -5746,7 +5831,7 @@
           <a:p>
             <a:fld id="{2E2D5BC7-3CC9-4CF8-9043-E85E9F2EC4FF}" type="datetimeFigureOut">
               <a:rPr lang="ko-KR" altLang="en-US" smtClean="0"/>
-              <a:t>2022-11-26</a:t>
+              <a:t>2023-01-05</a:t>
             </a:fld>
             <a:endParaRPr lang="ko-KR" altLang="en-US"/>
           </a:p>
@@ -5987,7 +6072,7 @@
           <a:p>
             <a:fld id="{2E2D5BC7-3CC9-4CF8-9043-E85E9F2EC4FF}" type="datetimeFigureOut">
               <a:rPr lang="ko-KR" altLang="en-US" smtClean="0"/>
-              <a:t>2022-11-26</a:t>
+              <a:t>2023-01-05</a:t>
             </a:fld>
             <a:endParaRPr lang="ko-KR" altLang="en-US"/>
           </a:p>
@@ -9972,10 +10057,10 @@
       </p:grpSpPr>
       <p:sp>
         <p:nvSpPr>
-          <p:cNvPr id="4" name="TextBox 3">
-            <a:extLst>
-              <a:ext uri="{FF2B5EF4-FFF2-40B4-BE49-F238E27FC236}">
-                <a16:creationId xmlns:a16="http://schemas.microsoft.com/office/drawing/2014/main" id="{253AFF4E-34A2-EBC4-9671-C2D5DEBA9D07}"/>
+          <p:cNvPr id="2" name="TextBox 1">
+            <a:extLst>
+              <a:ext uri="{FF2B5EF4-FFF2-40B4-BE49-F238E27FC236}">
+                <a16:creationId xmlns:a16="http://schemas.microsoft.com/office/drawing/2014/main" id="{2A1CB3E1-0179-A769-9EB1-1D24BD0F0746}"/>
               </a:ext>
             </a:extLst>
           </p:cNvPr>
@@ -9984,8 +10069,8 @@
         </p:nvSpPr>
         <p:spPr>
           <a:xfrm>
-            <a:off x="4747715" y="3105835"/>
-            <a:ext cx="2696572" cy="646331"/>
+            <a:off x="931784" y="270561"/>
+            <a:ext cx="10328468" cy="584775"/>
           </a:xfrm>
           <a:prstGeom prst="rect">
             <a:avLst/>
@@ -10000,20 +10085,188 @@
           <a:p>
             <a:pPr algn="ctr"/>
             <a:r>
-              <a:rPr lang="en-US" altLang="ko-KR" sz="3600" dirty="0"/>
-              <a:t>Branch </a:t>
-            </a:r>
-            <a:r>
-              <a:rPr lang="ko-KR" altLang="en-US" sz="3600" dirty="0"/>
-              <a:t>삭제</a:t>
-            </a:r>
-          </a:p>
-        </p:txBody>
-      </p:sp>
+              <a:rPr lang="en-US" altLang="ko-KR" sz="3200" dirty="0"/>
+              <a:t>[</a:t>
+            </a:r>
+            <a:r>
+              <a:rPr lang="ko-KR" altLang="en-US" sz="3200" dirty="0"/>
+              <a:t>원격 저장소에 존재하는 </a:t>
+            </a:r>
+            <a:r>
+              <a:rPr lang="ko-KR" altLang="en-US" sz="3200" dirty="0" err="1"/>
+              <a:t>브랜치</a:t>
+            </a:r>
+            <a:r>
+              <a:rPr lang="ko-KR" altLang="en-US" sz="3200" dirty="0"/>
+              <a:t> 기반으로 </a:t>
+            </a:r>
+            <a:r>
+              <a:rPr lang="ko-KR" altLang="en-US" sz="3200" dirty="0" err="1"/>
+              <a:t>브랜치</a:t>
+            </a:r>
+            <a:r>
+              <a:rPr lang="ko-KR" altLang="en-US" sz="3200" dirty="0"/>
+              <a:t> 생성</a:t>
+            </a:r>
+            <a:r>
+              <a:rPr lang="en-US" altLang="ko-KR" sz="3200" dirty="0"/>
+              <a:t>]</a:t>
+            </a:r>
+          </a:p>
+        </p:txBody>
+      </p:sp>
+      <p:sp>
+        <p:nvSpPr>
+          <p:cNvPr id="5" name="TextBox 4">
+            <a:extLst>
+              <a:ext uri="{FF2B5EF4-FFF2-40B4-BE49-F238E27FC236}">
+                <a16:creationId xmlns:a16="http://schemas.microsoft.com/office/drawing/2014/main" id="{D4594FDA-BE78-F39E-1C5F-B869083B956A}"/>
+              </a:ext>
+            </a:extLst>
+          </p:cNvPr>
+          <p:cNvSpPr txBox="1"/>
+          <p:nvPr/>
+        </p:nvSpPr>
+        <p:spPr>
+          <a:xfrm>
+            <a:off x="1842269" y="5786936"/>
+            <a:ext cx="8507521" cy="646331"/>
+          </a:xfrm>
+          <a:prstGeom prst="rect">
+            <a:avLst/>
+          </a:prstGeom>
+          <a:noFill/>
+        </p:spPr>
+        <p:txBody>
+          <a:bodyPr wrap="none" rtlCol="0">
+            <a:spAutoFit/>
+          </a:bodyPr>
+          <a:lstStyle/>
+          <a:p>
+            <a:pPr algn="ctr"/>
+            <a:r>
+              <a:rPr lang="en-US" altLang="ko-KR" dirty="0"/>
+              <a:t>History</a:t>
+            </a:r>
+            <a:r>
+              <a:rPr lang="ko-KR" altLang="en-US" dirty="0"/>
+              <a:t> 화면에서 원격 저장소에 존재하는 </a:t>
+            </a:r>
+            <a:r>
+              <a:rPr lang="ko-KR" altLang="en-US" dirty="0" err="1"/>
+              <a:t>브랜치의</a:t>
+            </a:r>
+            <a:r>
+              <a:rPr lang="ko-KR" altLang="en-US" dirty="0"/>
+              <a:t> 마지막 </a:t>
+            </a:r>
+            <a:r>
+              <a:rPr lang="ko-KR" altLang="en-US" dirty="0" err="1"/>
+              <a:t>커밋을</a:t>
+            </a:r>
+            <a:r>
+              <a:rPr lang="ko-KR" altLang="en-US" dirty="0"/>
+              <a:t> </a:t>
+            </a:r>
+            <a:r>
+              <a:rPr lang="ko-KR" altLang="en-US" dirty="0" err="1"/>
+              <a:t>더블클릭하면</a:t>
+            </a:r>
+            <a:endParaRPr lang="en-US" altLang="ko-KR" dirty="0"/>
+          </a:p>
+          <a:p>
+            <a:pPr algn="ctr"/>
+            <a:r>
+              <a:rPr lang="ko-KR" altLang="en-US" dirty="0"/>
+              <a:t>자동으로 원격 </a:t>
+            </a:r>
+            <a:r>
+              <a:rPr lang="ko-KR" altLang="en-US" dirty="0" err="1"/>
+              <a:t>브랜치를</a:t>
+            </a:r>
+            <a:r>
+              <a:rPr lang="ko-KR" altLang="en-US" dirty="0"/>
+              <a:t> 추적하는 </a:t>
+            </a:r>
+            <a:r>
+              <a:rPr lang="ko-KR" altLang="en-US" dirty="0" err="1"/>
+              <a:t>브랜치를</a:t>
+            </a:r>
+            <a:r>
+              <a:rPr lang="ko-KR" altLang="en-US" dirty="0"/>
+              <a:t> 생성할 수 있다</a:t>
+            </a:r>
+            <a:r>
+              <a:rPr lang="en-US" altLang="ko-KR" dirty="0"/>
+              <a:t>.</a:t>
+            </a:r>
+          </a:p>
+        </p:txBody>
+      </p:sp>
+      <p:pic>
+        <p:nvPicPr>
+          <p:cNvPr id="6" name="그림 5">
+            <a:extLst>
+              <a:ext uri="{FF2B5EF4-FFF2-40B4-BE49-F238E27FC236}">
+                <a16:creationId xmlns:a16="http://schemas.microsoft.com/office/drawing/2014/main" id="{1FA2E42E-C2C9-1CA7-DDC9-B6F10D93DF35}"/>
+              </a:ext>
+            </a:extLst>
+          </p:cNvPr>
+          <p:cNvPicPr>
+            <a:picLocks noChangeAspect="1"/>
+          </p:cNvPicPr>
+          <p:nvPr/>
+        </p:nvPicPr>
+        <p:blipFill>
+          <a:blip r:embed="rId3"/>
+          <a:stretch>
+            <a:fillRect/>
+          </a:stretch>
+        </p:blipFill>
+        <p:spPr>
+          <a:xfrm>
+            <a:off x="358979" y="1520727"/>
+            <a:ext cx="5588287" cy="3816546"/>
+          </a:xfrm>
+          <a:prstGeom prst="rect">
+            <a:avLst/>
+          </a:prstGeom>
+        </p:spPr>
+      </p:pic>
+      <p:pic>
+        <p:nvPicPr>
+          <p:cNvPr id="10" name="그림 9">
+            <a:extLst>
+              <a:ext uri="{FF2B5EF4-FFF2-40B4-BE49-F238E27FC236}">
+                <a16:creationId xmlns:a16="http://schemas.microsoft.com/office/drawing/2014/main" id="{99920027-D22B-73A6-D8A3-98012ECD20D9}"/>
+              </a:ext>
+            </a:extLst>
+          </p:cNvPr>
+          <p:cNvPicPr>
+            <a:picLocks noChangeAspect="1"/>
+          </p:cNvPicPr>
+          <p:nvPr/>
+        </p:nvPicPr>
+        <p:blipFill>
+          <a:blip r:embed="rId4"/>
+          <a:stretch>
+            <a:fillRect/>
+          </a:stretch>
+        </p:blipFill>
+        <p:spPr>
+          <a:xfrm>
+            <a:off x="6244735" y="2158934"/>
+            <a:ext cx="5467631" cy="2540131"/>
+          </a:xfrm>
+          <a:prstGeom prst="rect">
+            <a:avLst/>
+          </a:prstGeom>
+        </p:spPr>
+      </p:pic>
     </p:spTree>
     <p:extLst>
       <p:ext uri="{BB962C8B-B14F-4D97-AF65-F5344CB8AC3E}">
-        <p14:creationId xmlns:p14="http://schemas.microsoft.com/office/powerpoint/2010/main" val="2351713297"/>
+        <p14:creationId xmlns:p14="http://schemas.microsoft.com/office/powerpoint/2010/main" val="2861270207"/>
       </p:ext>
     </p:extLst>
   </p:cSld>
@@ -10042,10 +10295,10 @@
       </p:grpSpPr>
       <p:sp>
         <p:nvSpPr>
-          <p:cNvPr id="6" name="TextBox 5">
-            <a:extLst>
-              <a:ext uri="{FF2B5EF4-FFF2-40B4-BE49-F238E27FC236}">
-                <a16:creationId xmlns:a16="http://schemas.microsoft.com/office/drawing/2014/main" id="{F6147AD3-740E-DA09-22B6-43F39FF02B80}"/>
+          <p:cNvPr id="4" name="TextBox 3">
+            <a:extLst>
+              <a:ext uri="{FF2B5EF4-FFF2-40B4-BE49-F238E27FC236}">
+                <a16:creationId xmlns:a16="http://schemas.microsoft.com/office/drawing/2014/main" id="{253AFF4E-34A2-EBC4-9671-C2D5DEBA9D07}"/>
               </a:ext>
             </a:extLst>
           </p:cNvPr>
@@ -10054,8 +10307,8 @@
         </p:nvSpPr>
         <p:spPr>
           <a:xfrm>
-            <a:off x="4131473" y="270561"/>
-            <a:ext cx="3929089" cy="584775"/>
+            <a:off x="4747715" y="3105835"/>
+            <a:ext cx="2696572" cy="646331"/>
           </a:xfrm>
           <a:prstGeom prst="rect">
             <a:avLst/>
@@ -10070,61 +10323,20 @@
           <a:p>
             <a:pPr algn="ctr"/>
             <a:r>
-              <a:rPr lang="en-US" altLang="ko-KR" sz="3200" dirty="0"/>
-              <a:t>[branch-test </a:t>
-            </a:r>
-            <a:r>
-              <a:rPr lang="ko-KR" altLang="en-US" sz="3200" dirty="0"/>
+              <a:rPr lang="en-US" altLang="ko-KR" sz="3600" dirty="0"/>
+              <a:t>Branch </a:t>
+            </a:r>
+            <a:r>
+              <a:rPr lang="ko-KR" altLang="en-US" sz="3600" dirty="0"/>
               <a:t>삭제</a:t>
             </a:r>
-            <a:r>
-              <a:rPr lang="ko-KR" altLang="en-US" sz="3200" dirty="0">
-                <a:latin typeface="맑은 고딕" panose="020B0503020000020004" pitchFamily="50" charset="-127"/>
-                <a:ea typeface="맑은 고딕" panose="020B0503020000020004" pitchFamily="50" charset="-127"/>
-              </a:rPr>
-              <a:t>①</a:t>
-            </a:r>
-            <a:r>
-              <a:rPr lang="en-US" altLang="ko-KR" sz="3200" dirty="0"/>
-              <a:t>]</a:t>
-            </a:r>
-          </a:p>
-        </p:txBody>
-      </p:sp>
-      <p:pic>
-        <p:nvPicPr>
-          <p:cNvPr id="8" name="그림 7">
-            <a:extLst>
-              <a:ext uri="{FF2B5EF4-FFF2-40B4-BE49-F238E27FC236}">
-                <a16:creationId xmlns:a16="http://schemas.microsoft.com/office/drawing/2014/main" id="{DC4DED21-BEF4-646C-8FC3-6D0057414B75}"/>
-              </a:ext>
-            </a:extLst>
-          </p:cNvPr>
-          <p:cNvPicPr>
-            <a:picLocks noChangeAspect="1"/>
-          </p:cNvPicPr>
-          <p:nvPr/>
-        </p:nvPicPr>
-        <p:blipFill>
-          <a:blip r:embed="rId2"/>
-          <a:stretch>
-            <a:fillRect/>
-          </a:stretch>
-        </p:blipFill>
-        <p:spPr>
-          <a:xfrm>
-            <a:off x="1815047" y="1348047"/>
-            <a:ext cx="8561905" cy="4161905"/>
-          </a:xfrm>
-          <a:prstGeom prst="rect">
-            <a:avLst/>
-          </a:prstGeom>
-        </p:spPr>
-      </p:pic>
+          </a:p>
+        </p:txBody>
+      </p:sp>
     </p:spTree>
     <p:extLst>
       <p:ext uri="{BB962C8B-B14F-4D97-AF65-F5344CB8AC3E}">
-        <p14:creationId xmlns:p14="http://schemas.microsoft.com/office/powerpoint/2010/main" val="3395127754"/>
+        <p14:creationId xmlns:p14="http://schemas.microsoft.com/office/powerpoint/2010/main" val="2351713297"/>
       </p:ext>
     </p:extLst>
   </p:cSld>
@@ -10204,10 +10416,10 @@
       </p:sp>
       <p:pic>
         <p:nvPicPr>
-          <p:cNvPr id="7" name="그림 6">
-            <a:extLst>
-              <a:ext uri="{FF2B5EF4-FFF2-40B4-BE49-F238E27FC236}">
-                <a16:creationId xmlns:a16="http://schemas.microsoft.com/office/drawing/2014/main" id="{BCB9D8FE-A9DE-2129-1D1F-9C1D03714519}"/>
+          <p:cNvPr id="8" name="그림 7">
+            <a:extLst>
+              <a:ext uri="{FF2B5EF4-FFF2-40B4-BE49-F238E27FC236}">
+                <a16:creationId xmlns:a16="http://schemas.microsoft.com/office/drawing/2014/main" id="{DC4DED21-BEF4-646C-8FC3-6D0057414B75}"/>
               </a:ext>
             </a:extLst>
           </p:cNvPr>
@@ -10224,38 +10436,8 @@
         </p:blipFill>
         <p:spPr>
           <a:xfrm>
-            <a:off x="7260204" y="2604087"/>
-            <a:ext cx="4342857" cy="1914286"/>
-          </a:xfrm>
-          <a:prstGeom prst="rect">
-            <a:avLst/>
-          </a:prstGeom>
-        </p:spPr>
-      </p:pic>
-      <p:pic>
-        <p:nvPicPr>
-          <p:cNvPr id="9" name="그림 8">
-            <a:extLst>
-              <a:ext uri="{FF2B5EF4-FFF2-40B4-BE49-F238E27FC236}">
-                <a16:creationId xmlns:a16="http://schemas.microsoft.com/office/drawing/2014/main" id="{F8DE0539-B02E-8429-00F5-8027DC2E020C}"/>
-              </a:ext>
-            </a:extLst>
-          </p:cNvPr>
-          <p:cNvPicPr>
-            <a:picLocks noChangeAspect="1"/>
-          </p:cNvPicPr>
-          <p:nvPr/>
-        </p:nvPicPr>
-        <p:blipFill>
-          <a:blip r:embed="rId3"/>
-          <a:stretch>
-            <a:fillRect/>
-          </a:stretch>
-        </p:blipFill>
-        <p:spPr>
-          <a:xfrm>
-            <a:off x="588939" y="1048047"/>
-            <a:ext cx="6561905" cy="4761905"/>
+            <a:off x="1815047" y="1348047"/>
+            <a:ext cx="8561905" cy="4161905"/>
           </a:xfrm>
           <a:prstGeom prst="rect">
             <a:avLst/>
@@ -10265,7 +10447,7 @@
     </p:spTree>
     <p:extLst>
       <p:ext uri="{BB962C8B-B14F-4D97-AF65-F5344CB8AC3E}">
-        <p14:creationId xmlns:p14="http://schemas.microsoft.com/office/powerpoint/2010/main" val="24849657"/>
+        <p14:creationId xmlns:p14="http://schemas.microsoft.com/office/powerpoint/2010/main" val="3395127754"/>
       </p:ext>
     </p:extLst>
   </p:cSld>
@@ -10345,10 +10527,10 @@
       </p:sp>
       <p:pic>
         <p:nvPicPr>
-          <p:cNvPr id="4" name="그림 3">
-            <a:extLst>
-              <a:ext uri="{FF2B5EF4-FFF2-40B4-BE49-F238E27FC236}">
-                <a16:creationId xmlns:a16="http://schemas.microsoft.com/office/drawing/2014/main" id="{0AAFDCA2-9C4A-5081-5AE5-0BE14D5E9B15}"/>
+          <p:cNvPr id="7" name="그림 6">
+            <a:extLst>
+              <a:ext uri="{FF2B5EF4-FFF2-40B4-BE49-F238E27FC236}">
+                <a16:creationId xmlns:a16="http://schemas.microsoft.com/office/drawing/2014/main" id="{BCB9D8FE-A9DE-2129-1D1F-9C1D03714519}"/>
               </a:ext>
             </a:extLst>
           </p:cNvPr>
@@ -10365,74 +10547,48 @@
         </p:blipFill>
         <p:spPr>
           <a:xfrm>
-            <a:off x="0" y="1263022"/>
-            <a:ext cx="12192000" cy="4331956"/>
+            <a:off x="7260204" y="2604087"/>
+            <a:ext cx="4342857" cy="1914286"/>
           </a:xfrm>
           <a:prstGeom prst="rect">
             <a:avLst/>
           </a:prstGeom>
         </p:spPr>
       </p:pic>
-      <p:sp>
-        <p:nvSpPr>
-          <p:cNvPr id="5" name="TextBox 4">
-            <a:extLst>
-              <a:ext uri="{FF2B5EF4-FFF2-40B4-BE49-F238E27FC236}">
-                <a16:creationId xmlns:a16="http://schemas.microsoft.com/office/drawing/2014/main" id="{2F8A2B46-4B40-A84A-DAE2-A4BB9D14F19F}"/>
-              </a:ext>
-            </a:extLst>
-          </p:cNvPr>
-          <p:cNvSpPr txBox="1"/>
+      <p:pic>
+        <p:nvPicPr>
+          <p:cNvPr id="9" name="그림 8">
+            <a:extLst>
+              <a:ext uri="{FF2B5EF4-FFF2-40B4-BE49-F238E27FC236}">
+                <a16:creationId xmlns:a16="http://schemas.microsoft.com/office/drawing/2014/main" id="{F8DE0539-B02E-8429-00F5-8027DC2E020C}"/>
+              </a:ext>
+            </a:extLst>
+          </p:cNvPr>
+          <p:cNvPicPr>
+            <a:picLocks noChangeAspect="1"/>
+          </p:cNvPicPr>
           <p:nvPr/>
-        </p:nvSpPr>
+        </p:nvPicPr>
+        <p:blipFill>
+          <a:blip r:embed="rId3"/>
+          <a:stretch>
+            <a:fillRect/>
+          </a:stretch>
+        </p:blipFill>
         <p:spPr>
           <a:xfrm>
-            <a:off x="2627765" y="5941108"/>
-            <a:ext cx="6936515" cy="369332"/>
+            <a:off x="588939" y="1048047"/>
+            <a:ext cx="6561905" cy="4761905"/>
           </a:xfrm>
           <a:prstGeom prst="rect">
             <a:avLst/>
           </a:prstGeom>
-          <a:noFill/>
         </p:spPr>
-        <p:txBody>
-          <a:bodyPr wrap="none" rtlCol="0">
-            <a:spAutoFit/>
-          </a:bodyPr>
-          <a:lstStyle/>
-          <a:p>
-            <a:pPr algn="ctr"/>
-            <a:r>
-              <a:rPr lang="ko-KR" altLang="en-US" dirty="0"/>
-              <a:t>본인이 현재 위치한 </a:t>
-            </a:r>
-            <a:r>
-              <a:rPr lang="en-US" altLang="ko-KR" dirty="0"/>
-              <a:t>branch</a:t>
-            </a:r>
-            <a:r>
-              <a:rPr lang="ko-KR" altLang="en-US" dirty="0"/>
-              <a:t>에서는 해당 </a:t>
-            </a:r>
-            <a:r>
-              <a:rPr lang="en-US" altLang="ko-KR" dirty="0"/>
-              <a:t>branch</a:t>
-            </a:r>
-            <a:r>
-              <a:rPr lang="ko-KR" altLang="en-US" dirty="0"/>
-              <a:t>를 삭제할 수 없다</a:t>
-            </a:r>
-            <a:r>
-              <a:rPr lang="en-US" altLang="ko-KR" dirty="0"/>
-              <a:t>.</a:t>
-            </a:r>
-          </a:p>
-        </p:txBody>
-      </p:sp>
+      </p:pic>
     </p:spTree>
     <p:extLst>
       <p:ext uri="{BB962C8B-B14F-4D97-AF65-F5344CB8AC3E}">
-        <p14:creationId xmlns:p14="http://schemas.microsoft.com/office/powerpoint/2010/main" val="966179680"/>
+        <p14:creationId xmlns:p14="http://schemas.microsoft.com/office/powerpoint/2010/main" val="24849657"/>
       </p:ext>
     </p:extLst>
   </p:cSld>
@@ -10510,76 +10666,12 @@
           </a:p>
         </p:txBody>
       </p:sp>
-      <p:sp>
-        <p:nvSpPr>
-          <p:cNvPr id="5" name="TextBox 4">
-            <a:extLst>
-              <a:ext uri="{FF2B5EF4-FFF2-40B4-BE49-F238E27FC236}">
-                <a16:creationId xmlns:a16="http://schemas.microsoft.com/office/drawing/2014/main" id="{2F8A2B46-4B40-A84A-DAE2-A4BB9D14F19F}"/>
-              </a:ext>
-            </a:extLst>
-          </p:cNvPr>
-          <p:cNvSpPr txBox="1"/>
-          <p:nvPr/>
-        </p:nvSpPr>
-        <p:spPr>
-          <a:xfrm>
-            <a:off x="1734263" y="5941108"/>
-            <a:ext cx="8723542" cy="369332"/>
-          </a:xfrm>
-          <a:prstGeom prst="rect">
-            <a:avLst/>
-          </a:prstGeom>
-          <a:noFill/>
-        </p:spPr>
-        <p:txBody>
-          <a:bodyPr wrap="none" rtlCol="0">
-            <a:spAutoFit/>
-          </a:bodyPr>
-          <a:lstStyle/>
-          <a:p>
-            <a:pPr algn="ctr"/>
-            <a:r>
-              <a:rPr lang="en-US" altLang="ko-KR" dirty="0" err="1"/>
-              <a:t>nsh</a:t>
-            </a:r>
-            <a:r>
-              <a:rPr lang="en-US" altLang="ko-KR" dirty="0"/>
-              <a:t> branch</a:t>
-            </a:r>
-            <a:r>
-              <a:rPr lang="ko-KR" altLang="en-US" dirty="0"/>
-              <a:t>로 체크아웃한 다음에 </a:t>
-            </a:r>
-            <a:r>
-              <a:rPr lang="en-US" altLang="ko-KR" dirty="0"/>
-              <a:t>branch-test</a:t>
-            </a:r>
-            <a:r>
-              <a:rPr lang="ko-KR" altLang="en-US" dirty="0"/>
-              <a:t> </a:t>
-            </a:r>
-            <a:r>
-              <a:rPr lang="en-US" altLang="ko-KR" dirty="0"/>
-              <a:t>branch</a:t>
-            </a:r>
-            <a:r>
-              <a:rPr lang="ko-KR" altLang="en-US" dirty="0"/>
-              <a:t>를 삭제해야 삭제가 진행된다</a:t>
-            </a:r>
-            <a:r>
-              <a:rPr lang="en-US" altLang="ko-KR" dirty="0"/>
-              <a:t>.</a:t>
-            </a:r>
-          </a:p>
-        </p:txBody>
-      </p:sp>
       <p:pic>
         <p:nvPicPr>
-          <p:cNvPr id="3" name="그림 2">
-            <a:extLst>
-              <a:ext uri="{FF2B5EF4-FFF2-40B4-BE49-F238E27FC236}">
-                <a16:creationId xmlns:a16="http://schemas.microsoft.com/office/drawing/2014/main" id="{1F93B9AB-07B0-6D3A-708C-B44BED6D4FE7}"/>
+          <p:cNvPr id="4" name="그림 3">
+            <a:extLst>
+              <a:ext uri="{FF2B5EF4-FFF2-40B4-BE49-F238E27FC236}">
+                <a16:creationId xmlns:a16="http://schemas.microsoft.com/office/drawing/2014/main" id="{0AAFDCA2-9C4A-5081-5AE5-0BE14D5E9B15}"/>
               </a:ext>
             </a:extLst>
           </p:cNvPr>
@@ -10596,47 +10688,74 @@
         </p:blipFill>
         <p:spPr>
           <a:xfrm>
-            <a:off x="1373301" y="1033762"/>
-            <a:ext cx="4142857" cy="4790476"/>
+            <a:off x="0" y="1263022"/>
+            <a:ext cx="12192000" cy="4331956"/>
           </a:xfrm>
           <a:prstGeom prst="rect">
             <a:avLst/>
           </a:prstGeom>
         </p:spPr>
       </p:pic>
-      <p:pic>
-        <p:nvPicPr>
-          <p:cNvPr id="9" name="그림 8">
-            <a:extLst>
-              <a:ext uri="{FF2B5EF4-FFF2-40B4-BE49-F238E27FC236}">
-                <a16:creationId xmlns:a16="http://schemas.microsoft.com/office/drawing/2014/main" id="{32FDF5F2-FA71-DBA2-591D-2C8EE86406FC}"/>
-              </a:ext>
-            </a:extLst>
-          </p:cNvPr>
-          <p:cNvPicPr>
-            <a:picLocks noChangeAspect="1"/>
-          </p:cNvPicPr>
+      <p:sp>
+        <p:nvSpPr>
+          <p:cNvPr id="5" name="TextBox 4">
+            <a:extLst>
+              <a:ext uri="{FF2B5EF4-FFF2-40B4-BE49-F238E27FC236}">
+                <a16:creationId xmlns:a16="http://schemas.microsoft.com/office/drawing/2014/main" id="{2F8A2B46-4B40-A84A-DAE2-A4BB9D14F19F}"/>
+              </a:ext>
+            </a:extLst>
+          </p:cNvPr>
+          <p:cNvSpPr txBox="1"/>
           <p:nvPr/>
-        </p:nvPicPr>
-        <p:blipFill rotWithShape="1">
-          <a:blip r:embed="rId3"/>
-          <a:srcRect r="37081"/>
-          <a:stretch/>
-        </p:blipFill>
+        </p:nvSpPr>
         <p:spPr>
           <a:xfrm>
-            <a:off x="6156810" y="1329000"/>
-            <a:ext cx="5423091" cy="4200000"/>
+            <a:off x="2627765" y="5941108"/>
+            <a:ext cx="6936515" cy="369332"/>
           </a:xfrm>
           <a:prstGeom prst="rect">
             <a:avLst/>
           </a:prstGeom>
+          <a:noFill/>
         </p:spPr>
-      </p:pic>
+        <p:txBody>
+          <a:bodyPr wrap="none" rtlCol="0">
+            <a:spAutoFit/>
+          </a:bodyPr>
+          <a:lstStyle/>
+          <a:p>
+            <a:pPr algn="ctr"/>
+            <a:r>
+              <a:rPr lang="ko-KR" altLang="en-US" dirty="0"/>
+              <a:t>본인이 현재 위치한 </a:t>
+            </a:r>
+            <a:r>
+              <a:rPr lang="en-US" altLang="ko-KR" dirty="0"/>
+              <a:t>branch</a:t>
+            </a:r>
+            <a:r>
+              <a:rPr lang="ko-KR" altLang="en-US" dirty="0"/>
+              <a:t>에서는 해당 </a:t>
+            </a:r>
+            <a:r>
+              <a:rPr lang="en-US" altLang="ko-KR" dirty="0"/>
+              <a:t>branch</a:t>
+            </a:r>
+            <a:r>
+              <a:rPr lang="ko-KR" altLang="en-US" dirty="0"/>
+              <a:t>를 삭제할 수 없다</a:t>
+            </a:r>
+            <a:r>
+              <a:rPr lang="en-US" altLang="ko-KR" dirty="0"/>
+              <a:t>.</a:t>
+            </a:r>
+          </a:p>
+        </p:txBody>
+      </p:sp>
     </p:spTree>
     <p:extLst>
       <p:ext uri="{BB962C8B-B14F-4D97-AF65-F5344CB8AC3E}">
-        <p14:creationId xmlns:p14="http://schemas.microsoft.com/office/powerpoint/2010/main" val="1936210471"/>
+        <p14:creationId xmlns:p14="http://schemas.microsoft.com/office/powerpoint/2010/main" val="966179680"/>
       </p:ext>
     </p:extLst>
   </p:cSld>
@@ -10698,7 +10817,14 @@
             </a:r>
             <a:r>
               <a:rPr lang="ko-KR" altLang="en-US" sz="3200" dirty="0"/>
-              <a:t>삭제②</a:t>
+              <a:t>삭제</a:t>
+            </a:r>
+            <a:r>
+              <a:rPr lang="ko-KR" altLang="en-US" sz="3200" dirty="0">
+                <a:latin typeface="맑은 고딕" panose="020B0503020000020004" pitchFamily="50" charset="-127"/>
+                <a:ea typeface="맑은 고딕" panose="020B0503020000020004" pitchFamily="50" charset="-127"/>
+              </a:rPr>
+              <a:t>①</a:t>
             </a:r>
             <a:r>
               <a:rPr lang="en-US" altLang="ko-KR" sz="3200" dirty="0"/>
@@ -10707,12 +10833,76 @@
           </a:p>
         </p:txBody>
       </p:sp>
+      <p:sp>
+        <p:nvSpPr>
+          <p:cNvPr id="5" name="TextBox 4">
+            <a:extLst>
+              <a:ext uri="{FF2B5EF4-FFF2-40B4-BE49-F238E27FC236}">
+                <a16:creationId xmlns:a16="http://schemas.microsoft.com/office/drawing/2014/main" id="{2F8A2B46-4B40-A84A-DAE2-A4BB9D14F19F}"/>
+              </a:ext>
+            </a:extLst>
+          </p:cNvPr>
+          <p:cNvSpPr txBox="1"/>
+          <p:nvPr/>
+        </p:nvSpPr>
+        <p:spPr>
+          <a:xfrm>
+            <a:off x="1734263" y="5941108"/>
+            <a:ext cx="8723542" cy="369332"/>
+          </a:xfrm>
+          <a:prstGeom prst="rect">
+            <a:avLst/>
+          </a:prstGeom>
+          <a:noFill/>
+        </p:spPr>
+        <p:txBody>
+          <a:bodyPr wrap="none" rtlCol="0">
+            <a:spAutoFit/>
+          </a:bodyPr>
+          <a:lstStyle/>
+          <a:p>
+            <a:pPr algn="ctr"/>
+            <a:r>
+              <a:rPr lang="en-US" altLang="ko-KR" dirty="0" err="1"/>
+              <a:t>nsh</a:t>
+            </a:r>
+            <a:r>
+              <a:rPr lang="en-US" altLang="ko-KR" dirty="0"/>
+              <a:t> branch</a:t>
+            </a:r>
+            <a:r>
+              <a:rPr lang="ko-KR" altLang="en-US" dirty="0"/>
+              <a:t>로 체크아웃한 다음에 </a:t>
+            </a:r>
+            <a:r>
+              <a:rPr lang="en-US" altLang="ko-KR" dirty="0"/>
+              <a:t>branch-test</a:t>
+            </a:r>
+            <a:r>
+              <a:rPr lang="ko-KR" altLang="en-US" dirty="0"/>
+              <a:t> </a:t>
+            </a:r>
+            <a:r>
+              <a:rPr lang="en-US" altLang="ko-KR" dirty="0"/>
+              <a:t>branch</a:t>
+            </a:r>
+            <a:r>
+              <a:rPr lang="ko-KR" altLang="en-US" dirty="0"/>
+              <a:t>를 삭제해야 삭제가 진행된다</a:t>
+            </a:r>
+            <a:r>
+              <a:rPr lang="en-US" altLang="ko-KR" dirty="0"/>
+              <a:t>.</a:t>
+            </a:r>
+          </a:p>
+        </p:txBody>
+      </p:sp>
       <p:pic>
         <p:nvPicPr>
-          <p:cNvPr id="8" name="그림 7">
-            <a:extLst>
-              <a:ext uri="{FF2B5EF4-FFF2-40B4-BE49-F238E27FC236}">
-                <a16:creationId xmlns:a16="http://schemas.microsoft.com/office/drawing/2014/main" id="{E0411B08-C687-C73C-A6EE-EC8830654F5A}"/>
+          <p:cNvPr id="3" name="그림 2">
+            <a:extLst>
+              <a:ext uri="{FF2B5EF4-FFF2-40B4-BE49-F238E27FC236}">
+                <a16:creationId xmlns:a16="http://schemas.microsoft.com/office/drawing/2014/main" id="{1F93B9AB-07B0-6D3A-708C-B44BED6D4FE7}"/>
               </a:ext>
             </a:extLst>
           </p:cNvPr>
@@ -10729,8 +10919,37 @@
         </p:blipFill>
         <p:spPr>
           <a:xfrm>
-            <a:off x="2729333" y="1248047"/>
-            <a:ext cx="6733333" cy="4361905"/>
+            <a:off x="1373301" y="1033762"/>
+            <a:ext cx="4142857" cy="4790476"/>
+          </a:xfrm>
+          <a:prstGeom prst="rect">
+            <a:avLst/>
+          </a:prstGeom>
+        </p:spPr>
+      </p:pic>
+      <p:pic>
+        <p:nvPicPr>
+          <p:cNvPr id="9" name="그림 8">
+            <a:extLst>
+              <a:ext uri="{FF2B5EF4-FFF2-40B4-BE49-F238E27FC236}">
+                <a16:creationId xmlns:a16="http://schemas.microsoft.com/office/drawing/2014/main" id="{32FDF5F2-FA71-DBA2-591D-2C8EE86406FC}"/>
+              </a:ext>
+            </a:extLst>
+          </p:cNvPr>
+          <p:cNvPicPr>
+            <a:picLocks noChangeAspect="1"/>
+          </p:cNvPicPr>
+          <p:nvPr/>
+        </p:nvPicPr>
+        <p:blipFill rotWithShape="1">
+          <a:blip r:embed="rId3"/>
+          <a:srcRect r="37081"/>
+          <a:stretch/>
+        </p:blipFill>
+        <p:spPr>
+          <a:xfrm>
+            <a:off x="6156810" y="1329000"/>
+            <a:ext cx="5423091" cy="4200000"/>
           </a:xfrm>
           <a:prstGeom prst="rect">
             <a:avLst/>
@@ -10740,7 +10959,7 @@
     </p:spTree>
     <p:extLst>
       <p:ext uri="{BB962C8B-B14F-4D97-AF65-F5344CB8AC3E}">
-        <p14:creationId xmlns:p14="http://schemas.microsoft.com/office/powerpoint/2010/main" val="1121670049"/>
+        <p14:creationId xmlns:p14="http://schemas.microsoft.com/office/powerpoint/2010/main" val="1936210471"/>
       </p:ext>
     </p:extLst>
   </p:cSld>
@@ -10811,108 +11030,12 @@
           </a:p>
         </p:txBody>
       </p:sp>
-      <p:sp>
-        <p:nvSpPr>
-          <p:cNvPr id="5" name="TextBox 4">
-            <a:extLst>
-              <a:ext uri="{FF2B5EF4-FFF2-40B4-BE49-F238E27FC236}">
-                <a16:creationId xmlns:a16="http://schemas.microsoft.com/office/drawing/2014/main" id="{2F8A2B46-4B40-A84A-DAE2-A4BB9D14F19F}"/>
-              </a:ext>
-            </a:extLst>
-          </p:cNvPr>
-          <p:cNvSpPr txBox="1"/>
-          <p:nvPr/>
-        </p:nvSpPr>
-        <p:spPr>
-          <a:xfrm>
-            <a:off x="1511312" y="5753731"/>
-            <a:ext cx="9169434" cy="646331"/>
-          </a:xfrm>
-          <a:prstGeom prst="rect">
-            <a:avLst/>
-          </a:prstGeom>
-          <a:noFill/>
-        </p:spPr>
-        <p:txBody>
-          <a:bodyPr wrap="none" rtlCol="0">
-            <a:spAutoFit/>
-          </a:bodyPr>
-          <a:lstStyle/>
-          <a:p>
-            <a:pPr algn="ctr"/>
-            <a:r>
-              <a:rPr lang="en-US" altLang="ko-KR" dirty="0"/>
-              <a:t>branch</a:t>
-            </a:r>
-            <a:r>
-              <a:rPr lang="ko-KR" altLang="en-US" dirty="0"/>
-              <a:t>가 삭제되면 </a:t>
-            </a:r>
-            <a:r>
-              <a:rPr lang="en-US" altLang="ko-KR" dirty="0"/>
-              <a:t>main branch</a:t>
-            </a:r>
-            <a:r>
-              <a:rPr lang="ko-KR" altLang="en-US" dirty="0"/>
-              <a:t>에 </a:t>
-            </a:r>
-            <a:r>
-              <a:rPr lang="en-US" altLang="ko-KR" dirty="0"/>
-              <a:t>merge</a:t>
-            </a:r>
-            <a:r>
-              <a:rPr lang="ko-KR" altLang="en-US" dirty="0"/>
-              <a:t>되지 않은 </a:t>
-            </a:r>
-            <a:r>
-              <a:rPr lang="en-US" altLang="ko-KR" dirty="0"/>
-              <a:t>commit</a:t>
-            </a:r>
-            <a:r>
-              <a:rPr lang="ko-KR" altLang="en-US" dirty="0"/>
-              <a:t>들도 함께 삭제되기 때문에</a:t>
-            </a:r>
-            <a:endParaRPr lang="en-US" altLang="ko-KR" dirty="0"/>
-          </a:p>
-          <a:p>
-            <a:pPr algn="ctr"/>
-            <a:r>
-              <a:rPr lang="en-US" altLang="ko-KR" dirty="0"/>
-              <a:t>main branch</a:t>
-            </a:r>
-            <a:r>
-              <a:rPr lang="ko-KR" altLang="en-US" dirty="0"/>
-              <a:t>에 </a:t>
-            </a:r>
-            <a:r>
-              <a:rPr lang="en-US" altLang="ko-KR" dirty="0"/>
-              <a:t>merge</a:t>
-            </a:r>
-            <a:r>
-              <a:rPr lang="ko-KR" altLang="en-US" dirty="0"/>
-              <a:t>되기 전에는 </a:t>
-            </a:r>
-            <a:r>
-              <a:rPr lang="en-US" altLang="ko-KR" dirty="0"/>
-              <a:t>branch</a:t>
-            </a:r>
-            <a:r>
-              <a:rPr lang="ko-KR" altLang="en-US" dirty="0"/>
-              <a:t>를 그냥 삭제할 수 없다</a:t>
-            </a:r>
-            <a:r>
-              <a:rPr lang="en-US" altLang="ko-KR" dirty="0"/>
-              <a:t>.</a:t>
-            </a:r>
-          </a:p>
-        </p:txBody>
-      </p:sp>
       <p:pic>
         <p:nvPicPr>
-          <p:cNvPr id="3" name="그림 2">
-            <a:extLst>
-              <a:ext uri="{FF2B5EF4-FFF2-40B4-BE49-F238E27FC236}">
-                <a16:creationId xmlns:a16="http://schemas.microsoft.com/office/drawing/2014/main" id="{2F9A8738-A47C-7762-6F67-C5D0CB0C751E}"/>
+          <p:cNvPr id="8" name="그림 7">
+            <a:extLst>
+              <a:ext uri="{FF2B5EF4-FFF2-40B4-BE49-F238E27FC236}">
+                <a16:creationId xmlns:a16="http://schemas.microsoft.com/office/drawing/2014/main" id="{E0411B08-C687-C73C-A6EE-EC8830654F5A}"/>
               </a:ext>
             </a:extLst>
           </p:cNvPr>
@@ -10929,8 +11052,8 @@
         </p:blipFill>
         <p:spPr>
           <a:xfrm>
-            <a:off x="0" y="1386394"/>
-            <a:ext cx="12192000" cy="4085211"/>
+            <a:off x="2729333" y="1248047"/>
+            <a:ext cx="6733333" cy="4361905"/>
           </a:xfrm>
           <a:prstGeom prst="rect">
             <a:avLst/>
@@ -10940,7 +11063,7 @@
     </p:spTree>
     <p:extLst>
       <p:ext uri="{BB962C8B-B14F-4D97-AF65-F5344CB8AC3E}">
-        <p14:creationId xmlns:p14="http://schemas.microsoft.com/office/powerpoint/2010/main" val="1219803612"/>
+        <p14:creationId xmlns:p14="http://schemas.microsoft.com/office/powerpoint/2010/main" val="1121670049"/>
       </p:ext>
     </p:extLst>
   </p:cSld>
@@ -11842,8 +11965,8 @@
         </p:nvSpPr>
         <p:spPr>
           <a:xfrm>
-            <a:off x="1980206" y="5941108"/>
-            <a:ext cx="8231677" cy="646331"/>
+            <a:off x="1511312" y="5753731"/>
+            <a:ext cx="9169434" cy="646331"/>
           </a:xfrm>
           <a:prstGeom prst="rect">
             <a:avLst/>
@@ -11858,57 +11981,78 @@
           <a:p>
             <a:pPr algn="ctr"/>
             <a:r>
-              <a:rPr lang="ko-KR" altLang="en-US" dirty="0"/>
-              <a:t>강력 삭제를 체크해야 </a:t>
-            </a:r>
-            <a:r>
               <a:rPr lang="en-US" altLang="ko-KR" dirty="0"/>
               <a:t>branch</a:t>
             </a:r>
             <a:r>
               <a:rPr lang="ko-KR" altLang="en-US" dirty="0"/>
-              <a:t>를 삭제할 수 있다</a:t>
+              <a:t>가 삭제되면 </a:t>
+            </a:r>
+            <a:r>
+              <a:rPr lang="en-US" altLang="ko-KR" dirty="0"/>
+              <a:t>main branch</a:t>
+            </a:r>
+            <a:r>
+              <a:rPr lang="ko-KR" altLang="en-US" dirty="0"/>
+              <a:t>에 </a:t>
+            </a:r>
+            <a:r>
+              <a:rPr lang="en-US" altLang="ko-KR" dirty="0"/>
+              <a:t>merge</a:t>
+            </a:r>
+            <a:r>
+              <a:rPr lang="ko-KR" altLang="en-US" dirty="0"/>
+              <a:t>되지 않은 </a:t>
+            </a:r>
+            <a:r>
+              <a:rPr lang="en-US" altLang="ko-KR" dirty="0"/>
+              <a:t>commit</a:t>
+            </a:r>
+            <a:r>
+              <a:rPr lang="ko-KR" altLang="en-US" dirty="0"/>
+              <a:t>들도 함께 삭제되기 때문에</a:t>
+            </a:r>
+            <a:endParaRPr lang="en-US" altLang="ko-KR" dirty="0"/>
+          </a:p>
+          <a:p>
+            <a:pPr algn="ctr"/>
+            <a:r>
+              <a:rPr lang="en-US" altLang="ko-KR" dirty="0"/>
+              <a:t>main branch</a:t>
+            </a:r>
+            <a:r>
+              <a:rPr lang="ko-KR" altLang="en-US" dirty="0"/>
+              <a:t>에 </a:t>
+            </a:r>
+            <a:r>
+              <a:rPr lang="en-US" altLang="ko-KR" dirty="0"/>
+              <a:t>merge</a:t>
+            </a:r>
+            <a:r>
+              <a:rPr lang="ko-KR" altLang="en-US" dirty="0"/>
+              <a:t>되기 전에는 </a:t>
+            </a:r>
+            <a:r>
+              <a:rPr lang="en-US" altLang="ko-KR" dirty="0"/>
+              <a:t>branch</a:t>
+            </a:r>
+            <a:r>
+              <a:rPr lang="ko-KR" altLang="en-US" dirty="0"/>
+              <a:t>를 그냥 삭제할 수 없다</a:t>
             </a:r>
             <a:r>
               <a:rPr lang="en-US" altLang="ko-KR" dirty="0"/>
               <a:t>.</a:t>
             </a:r>
           </a:p>
-          <a:p>
-            <a:pPr algn="ctr"/>
-            <a:r>
-              <a:rPr lang="ko-KR" altLang="en-US" dirty="0"/>
-              <a:t>다만 이 때에는 </a:t>
-            </a:r>
-            <a:r>
-              <a:rPr lang="en-US" altLang="ko-KR" dirty="0"/>
-              <a:t>merge</a:t>
-            </a:r>
-            <a:r>
-              <a:rPr lang="ko-KR" altLang="en-US" dirty="0"/>
-              <a:t>되지 않은 </a:t>
-            </a:r>
-            <a:r>
-              <a:rPr lang="en-US" altLang="ko-KR" dirty="0"/>
-              <a:t>commit</a:t>
-            </a:r>
-            <a:r>
-              <a:rPr lang="ko-KR" altLang="en-US" dirty="0"/>
-              <a:t>도 삭제 되기 때문에 주의가 필요하다</a:t>
-            </a:r>
-            <a:r>
-              <a:rPr lang="en-US" altLang="ko-KR" dirty="0"/>
-              <a:t>.</a:t>
-            </a:r>
-          </a:p>
         </p:txBody>
       </p:sp>
       <p:pic>
         <p:nvPicPr>
-          <p:cNvPr id="4" name="그림 3">
-            <a:extLst>
-              <a:ext uri="{FF2B5EF4-FFF2-40B4-BE49-F238E27FC236}">
-                <a16:creationId xmlns:a16="http://schemas.microsoft.com/office/drawing/2014/main" id="{97C682ED-7B9D-7CFA-A907-72F087EE4EFF}"/>
+          <p:cNvPr id="3" name="그림 2">
+            <a:extLst>
+              <a:ext uri="{FF2B5EF4-FFF2-40B4-BE49-F238E27FC236}">
+                <a16:creationId xmlns:a16="http://schemas.microsoft.com/office/drawing/2014/main" id="{2F9A8738-A47C-7762-6F67-C5D0CB0C751E}"/>
               </a:ext>
             </a:extLst>
           </p:cNvPr>
@@ -11925,38 +12069,8 @@
         </p:blipFill>
         <p:spPr>
           <a:xfrm>
-            <a:off x="270203" y="1095666"/>
-            <a:ext cx="7104762" cy="4666667"/>
-          </a:xfrm>
-          <a:prstGeom prst="rect">
-            <a:avLst/>
-          </a:prstGeom>
-        </p:spPr>
-      </p:pic>
-      <p:pic>
-        <p:nvPicPr>
-          <p:cNvPr id="8" name="그림 7">
-            <a:extLst>
-              <a:ext uri="{FF2B5EF4-FFF2-40B4-BE49-F238E27FC236}">
-                <a16:creationId xmlns:a16="http://schemas.microsoft.com/office/drawing/2014/main" id="{012D5948-FC4E-5FFB-2F7B-B816354D23A5}"/>
-              </a:ext>
-            </a:extLst>
-          </p:cNvPr>
-          <p:cNvPicPr>
-            <a:picLocks noChangeAspect="1"/>
-          </p:cNvPicPr>
-          <p:nvPr/>
-        </p:nvPicPr>
-        <p:blipFill>
-          <a:blip r:embed="rId3"/>
-          <a:stretch>
-            <a:fillRect/>
-          </a:stretch>
-        </p:blipFill>
-        <p:spPr>
-          <a:xfrm>
-            <a:off x="8196880" y="2457571"/>
-            <a:ext cx="3600000" cy="1942857"/>
+            <a:off x="0" y="1386394"/>
+            <a:ext cx="12192000" cy="4085211"/>
           </a:xfrm>
           <a:prstGeom prst="rect">
             <a:avLst/>
@@ -11966,7 +12080,7 @@
     </p:spTree>
     <p:extLst>
       <p:ext uri="{BB962C8B-B14F-4D97-AF65-F5344CB8AC3E}">
-        <p14:creationId xmlns:p14="http://schemas.microsoft.com/office/powerpoint/2010/main" val="4079782439"/>
+        <p14:creationId xmlns:p14="http://schemas.microsoft.com/office/powerpoint/2010/main" val="1219803612"/>
       </p:ext>
     </p:extLst>
   </p:cSld>
@@ -12007,8 +12121,8 @@
         </p:nvSpPr>
         <p:spPr>
           <a:xfrm>
-            <a:off x="3405214" y="270561"/>
-            <a:ext cx="5381602" cy="584775"/>
+            <a:off x="4131473" y="270561"/>
+            <a:ext cx="3929089" cy="584775"/>
           </a:xfrm>
           <a:prstGeom prst="rect">
             <a:avLst/>
@@ -12024,11 +12138,11 @@
             <a:pPr algn="ctr"/>
             <a:r>
               <a:rPr lang="en-US" altLang="ko-KR" sz="3200" dirty="0"/>
-              <a:t>[</a:t>
+              <a:t>[branch-test </a:t>
             </a:r>
             <a:r>
               <a:rPr lang="ko-KR" altLang="en-US" sz="3200" dirty="0"/>
-              <a:t>삭제 불가능한 케이스 정리</a:t>
+              <a:t>삭제②</a:t>
             </a:r>
             <a:r>
               <a:rPr lang="en-US" altLang="ko-KR" sz="3200" dirty="0"/>
@@ -12039,10 +12153,10 @@
       </p:sp>
       <p:sp>
         <p:nvSpPr>
-          <p:cNvPr id="2" name="TextBox 1">
-            <a:extLst>
-              <a:ext uri="{FF2B5EF4-FFF2-40B4-BE49-F238E27FC236}">
-                <a16:creationId xmlns:a16="http://schemas.microsoft.com/office/drawing/2014/main" id="{81E258BC-D895-618A-EE88-65FCA76909B4}"/>
+          <p:cNvPr id="5" name="TextBox 4">
+            <a:extLst>
+              <a:ext uri="{FF2B5EF4-FFF2-40B4-BE49-F238E27FC236}">
+                <a16:creationId xmlns:a16="http://schemas.microsoft.com/office/drawing/2014/main" id="{2F8A2B46-4B40-A84A-DAE2-A4BB9D14F19F}"/>
               </a:ext>
             </a:extLst>
           </p:cNvPr>
@@ -12051,8 +12165,8 @@
         </p:nvSpPr>
         <p:spPr>
           <a:xfrm>
-            <a:off x="1480067" y="2073645"/>
-            <a:ext cx="7249100" cy="369332"/>
+            <a:off x="1980206" y="5941108"/>
+            <a:ext cx="8231677" cy="646331"/>
           </a:xfrm>
           <a:prstGeom prst="rect">
             <a:avLst/>
@@ -12065,13 +12179,10 @@
           </a:bodyPr>
           <a:lstStyle/>
           <a:p>
-            <a:r>
-              <a:rPr lang="en-US" altLang="ko-KR" dirty="0"/>
-              <a:t>① </a:t>
-            </a:r>
+            <a:pPr algn="ctr"/>
             <a:r>
               <a:rPr lang="ko-KR" altLang="en-US" dirty="0"/>
-              <a:t>본인이 현재 위치한 </a:t>
+              <a:t>강력 삭제를 체크해야 </a:t>
             </a:r>
             <a:r>
               <a:rPr lang="en-US" altLang="ko-KR" dirty="0"/>
@@ -12079,160 +12190,106 @@
             </a:r>
             <a:r>
               <a:rPr lang="ko-KR" altLang="en-US" dirty="0"/>
-              <a:t>에서는 해당 </a:t>
-            </a:r>
-            <a:r>
-              <a:rPr lang="en-US" altLang="ko-KR" dirty="0"/>
-              <a:t>branch</a:t>
-            </a:r>
-            <a:r>
-              <a:rPr lang="ko-KR" altLang="en-US" dirty="0"/>
-              <a:t>를 삭제할 수 없다</a:t>
+              <a:t>를 삭제할 수 있다</a:t>
             </a:r>
             <a:r>
               <a:rPr lang="en-US" altLang="ko-KR" dirty="0"/>
               <a:t>.</a:t>
             </a:r>
           </a:p>
-        </p:txBody>
-      </p:sp>
-      <p:sp>
-        <p:nvSpPr>
-          <p:cNvPr id="3" name="TextBox 2">
-            <a:extLst>
-              <a:ext uri="{FF2B5EF4-FFF2-40B4-BE49-F238E27FC236}">
-                <a16:creationId xmlns:a16="http://schemas.microsoft.com/office/drawing/2014/main" id="{E857B5D3-CCC1-A009-1927-11808D7B3A76}"/>
-              </a:ext>
-            </a:extLst>
-          </p:cNvPr>
-          <p:cNvSpPr txBox="1"/>
+          <a:p>
+            <a:pPr algn="ctr"/>
+            <a:r>
+              <a:rPr lang="ko-KR" altLang="en-US" dirty="0"/>
+              <a:t>다만 이 때에는 </a:t>
+            </a:r>
+            <a:r>
+              <a:rPr lang="en-US" altLang="ko-KR" dirty="0"/>
+              <a:t>merge</a:t>
+            </a:r>
+            <a:r>
+              <a:rPr lang="ko-KR" altLang="en-US" dirty="0"/>
+              <a:t>되지 않은 </a:t>
+            </a:r>
+            <a:r>
+              <a:rPr lang="en-US" altLang="ko-KR" dirty="0"/>
+              <a:t>commit</a:t>
+            </a:r>
+            <a:r>
+              <a:rPr lang="ko-KR" altLang="en-US" dirty="0"/>
+              <a:t>도 삭제 되기 때문에 주의가 필요하다</a:t>
+            </a:r>
+            <a:r>
+              <a:rPr lang="en-US" altLang="ko-KR" dirty="0"/>
+              <a:t>.</a:t>
+            </a:r>
+          </a:p>
+        </p:txBody>
+      </p:sp>
+      <p:pic>
+        <p:nvPicPr>
+          <p:cNvPr id="4" name="그림 3">
+            <a:extLst>
+              <a:ext uri="{FF2B5EF4-FFF2-40B4-BE49-F238E27FC236}">
+                <a16:creationId xmlns:a16="http://schemas.microsoft.com/office/drawing/2014/main" id="{97C682ED-7B9D-7CFA-A907-72F087EE4EFF}"/>
+              </a:ext>
+            </a:extLst>
+          </p:cNvPr>
+          <p:cNvPicPr>
+            <a:picLocks noChangeAspect="1"/>
+          </p:cNvPicPr>
           <p:nvPr/>
-        </p:nvSpPr>
+        </p:nvPicPr>
+        <p:blipFill>
+          <a:blip r:embed="rId2"/>
+          <a:stretch>
+            <a:fillRect/>
+          </a:stretch>
+        </p:blipFill>
         <p:spPr>
           <a:xfrm>
-            <a:off x="1480067" y="2695737"/>
-            <a:ext cx="9231951" cy="923330"/>
+            <a:off x="270203" y="1095666"/>
+            <a:ext cx="7104762" cy="4666667"/>
           </a:xfrm>
           <a:prstGeom prst="rect">
             <a:avLst/>
           </a:prstGeom>
-          <a:noFill/>
         </p:spPr>
-        <p:txBody>
-          <a:bodyPr wrap="none" rtlCol="0">
-            <a:spAutoFit/>
-          </a:bodyPr>
-          <a:lstStyle/>
-          <a:p>
-            <a:r>
-              <a:rPr lang="en-US" altLang="ko-KR" dirty="0"/>
-              <a:t>② </a:t>
-            </a:r>
-            <a:r>
-              <a:rPr lang="ko-KR" altLang="en-US" dirty="0"/>
-              <a:t>작업물이 아직 </a:t>
-            </a:r>
-            <a:r>
-              <a:rPr lang="en-US" altLang="ko-KR" dirty="0"/>
-              <a:t>main branch</a:t>
-            </a:r>
-            <a:r>
-              <a:rPr lang="ko-KR" altLang="en-US" dirty="0"/>
-              <a:t>에 </a:t>
-            </a:r>
-            <a:r>
-              <a:rPr lang="en-US" altLang="ko-KR" dirty="0"/>
-              <a:t>merge</a:t>
-            </a:r>
-            <a:r>
-              <a:rPr lang="ko-KR" altLang="en-US" dirty="0"/>
-              <a:t>되지 않았을 때는 그냥 </a:t>
-            </a:r>
-            <a:r>
-              <a:rPr lang="en-US" altLang="ko-KR" dirty="0"/>
-              <a:t>branch</a:t>
-            </a:r>
-            <a:r>
-              <a:rPr lang="ko-KR" altLang="en-US" dirty="0"/>
-              <a:t>를 삭제할 수 없고</a:t>
-            </a:r>
-            <a:endParaRPr lang="en-US" altLang="ko-KR" dirty="0"/>
-          </a:p>
-          <a:p>
-            <a:r>
-              <a:rPr lang="en-US" altLang="ko-KR" dirty="0"/>
-              <a:t>    </a:t>
-            </a:r>
-            <a:r>
-              <a:rPr lang="ko-KR" altLang="en-US" dirty="0"/>
-              <a:t>강제 삭제를 통해 </a:t>
-            </a:r>
-            <a:r>
-              <a:rPr lang="en-US" altLang="ko-KR" dirty="0"/>
-              <a:t>branch </a:t>
-            </a:r>
-            <a:r>
-              <a:rPr lang="ko-KR" altLang="en-US" dirty="0"/>
-              <a:t>삭제가 가능하다</a:t>
-            </a:r>
-            <a:r>
-              <a:rPr lang="en-US" altLang="ko-KR" dirty="0"/>
-              <a:t>.</a:t>
-            </a:r>
-            <a:r>
-              <a:rPr lang="ko-KR" altLang="en-US" dirty="0"/>
-              <a:t> 이 때 </a:t>
-            </a:r>
-            <a:r>
-              <a:rPr lang="en-US" altLang="ko-KR" dirty="0"/>
-              <a:t>main</a:t>
-            </a:r>
-            <a:r>
-              <a:rPr lang="ko-KR" altLang="en-US" dirty="0"/>
-              <a:t> </a:t>
-            </a:r>
-            <a:r>
-              <a:rPr lang="en-US" altLang="ko-KR" dirty="0"/>
-              <a:t>branch</a:t>
-            </a:r>
-            <a:r>
-              <a:rPr lang="ko-KR" altLang="en-US" dirty="0"/>
-              <a:t>에 </a:t>
-            </a:r>
-            <a:r>
-              <a:rPr lang="en-US" altLang="ko-KR" dirty="0"/>
-              <a:t>merge</a:t>
-            </a:r>
-            <a:r>
-              <a:rPr lang="ko-KR" altLang="en-US" dirty="0"/>
-              <a:t>되지 않은</a:t>
-            </a:r>
-            <a:endParaRPr lang="en-US" altLang="ko-KR" dirty="0"/>
-          </a:p>
-          <a:p>
-            <a:r>
-              <a:rPr lang="ko-KR" altLang="en-US" dirty="0"/>
-              <a:t>    </a:t>
-            </a:r>
-            <a:r>
-              <a:rPr lang="en-US" altLang="ko-KR" dirty="0"/>
-              <a:t>commit</a:t>
-            </a:r>
-            <a:r>
-              <a:rPr lang="ko-KR" altLang="en-US" dirty="0"/>
-              <a:t>은 모두 삭제되므로 주의가 필요하다</a:t>
-            </a:r>
-            <a:r>
-              <a:rPr lang="en-US" altLang="ko-KR" dirty="0"/>
-              <a:t>.</a:t>
-            </a:r>
-          </a:p>
-        </p:txBody>
-      </p:sp>
+      </p:pic>
+      <p:pic>
+        <p:nvPicPr>
+          <p:cNvPr id="8" name="그림 7">
+            <a:extLst>
+              <a:ext uri="{FF2B5EF4-FFF2-40B4-BE49-F238E27FC236}">
+                <a16:creationId xmlns:a16="http://schemas.microsoft.com/office/drawing/2014/main" id="{012D5948-FC4E-5FFB-2F7B-B816354D23A5}"/>
+              </a:ext>
+            </a:extLst>
+          </p:cNvPr>
+          <p:cNvPicPr>
+            <a:picLocks noChangeAspect="1"/>
+          </p:cNvPicPr>
+          <p:nvPr/>
+        </p:nvPicPr>
+        <p:blipFill>
+          <a:blip r:embed="rId3"/>
+          <a:stretch>
+            <a:fillRect/>
+          </a:stretch>
+        </p:blipFill>
+        <p:spPr>
+          <a:xfrm>
+            <a:off x="8196880" y="2457571"/>
+            <a:ext cx="3600000" cy="1942857"/>
+          </a:xfrm>
+          <a:prstGeom prst="rect">
+            <a:avLst/>
+          </a:prstGeom>
+        </p:spPr>
+      </p:pic>
     </p:spTree>
     <p:extLst>
       <p:ext uri="{BB962C8B-B14F-4D97-AF65-F5344CB8AC3E}">
-        <p14:creationId xmlns:p14="http://schemas.microsoft.com/office/powerpoint/2010/main" val="1886429487"/>
+        <p14:creationId xmlns:p14="http://schemas.microsoft.com/office/powerpoint/2010/main" val="4079782439"/>
       </p:ext>
     </p:extLst>
   </p:cSld>
@@ -12261,6 +12318,272 @@
       </p:grpSpPr>
       <p:sp>
         <p:nvSpPr>
+          <p:cNvPr id="6" name="TextBox 5">
+            <a:extLst>
+              <a:ext uri="{FF2B5EF4-FFF2-40B4-BE49-F238E27FC236}">
+                <a16:creationId xmlns:a16="http://schemas.microsoft.com/office/drawing/2014/main" id="{F6147AD3-740E-DA09-22B6-43F39FF02B80}"/>
+              </a:ext>
+            </a:extLst>
+          </p:cNvPr>
+          <p:cNvSpPr txBox="1"/>
+          <p:nvPr/>
+        </p:nvSpPr>
+        <p:spPr>
+          <a:xfrm>
+            <a:off x="3405214" y="270561"/>
+            <a:ext cx="5381602" cy="584775"/>
+          </a:xfrm>
+          <a:prstGeom prst="rect">
+            <a:avLst/>
+          </a:prstGeom>
+          <a:noFill/>
+        </p:spPr>
+        <p:txBody>
+          <a:bodyPr wrap="none" rtlCol="0" anchor="ctr">
+            <a:spAutoFit/>
+          </a:bodyPr>
+          <a:lstStyle/>
+          <a:p>
+            <a:pPr algn="ctr"/>
+            <a:r>
+              <a:rPr lang="en-US" altLang="ko-KR" sz="3200" dirty="0"/>
+              <a:t>[</a:t>
+            </a:r>
+            <a:r>
+              <a:rPr lang="ko-KR" altLang="en-US" sz="3200" dirty="0"/>
+              <a:t>삭제 불가능한 케이스 정리</a:t>
+            </a:r>
+            <a:r>
+              <a:rPr lang="en-US" altLang="ko-KR" sz="3200" dirty="0"/>
+              <a:t>]</a:t>
+            </a:r>
+          </a:p>
+        </p:txBody>
+      </p:sp>
+      <p:sp>
+        <p:nvSpPr>
+          <p:cNvPr id="2" name="TextBox 1">
+            <a:extLst>
+              <a:ext uri="{FF2B5EF4-FFF2-40B4-BE49-F238E27FC236}">
+                <a16:creationId xmlns:a16="http://schemas.microsoft.com/office/drawing/2014/main" id="{81E258BC-D895-618A-EE88-65FCA76909B4}"/>
+              </a:ext>
+            </a:extLst>
+          </p:cNvPr>
+          <p:cNvSpPr txBox="1"/>
+          <p:nvPr/>
+        </p:nvSpPr>
+        <p:spPr>
+          <a:xfrm>
+            <a:off x="1480067" y="2073645"/>
+            <a:ext cx="7249100" cy="369332"/>
+          </a:xfrm>
+          <a:prstGeom prst="rect">
+            <a:avLst/>
+          </a:prstGeom>
+          <a:noFill/>
+        </p:spPr>
+        <p:txBody>
+          <a:bodyPr wrap="none" rtlCol="0">
+            <a:spAutoFit/>
+          </a:bodyPr>
+          <a:lstStyle/>
+          <a:p>
+            <a:r>
+              <a:rPr lang="en-US" altLang="ko-KR" dirty="0"/>
+              <a:t>① </a:t>
+            </a:r>
+            <a:r>
+              <a:rPr lang="ko-KR" altLang="en-US" dirty="0"/>
+              <a:t>본인이 현재 위치한 </a:t>
+            </a:r>
+            <a:r>
+              <a:rPr lang="en-US" altLang="ko-KR" dirty="0"/>
+              <a:t>branch</a:t>
+            </a:r>
+            <a:r>
+              <a:rPr lang="ko-KR" altLang="en-US" dirty="0"/>
+              <a:t>에서는 해당 </a:t>
+            </a:r>
+            <a:r>
+              <a:rPr lang="en-US" altLang="ko-KR" dirty="0"/>
+              <a:t>branch</a:t>
+            </a:r>
+            <a:r>
+              <a:rPr lang="ko-KR" altLang="en-US" dirty="0"/>
+              <a:t>를 삭제할 수 없다</a:t>
+            </a:r>
+            <a:r>
+              <a:rPr lang="en-US" altLang="ko-KR" dirty="0"/>
+              <a:t>.</a:t>
+            </a:r>
+          </a:p>
+        </p:txBody>
+      </p:sp>
+      <p:sp>
+        <p:nvSpPr>
+          <p:cNvPr id="3" name="TextBox 2">
+            <a:extLst>
+              <a:ext uri="{FF2B5EF4-FFF2-40B4-BE49-F238E27FC236}">
+                <a16:creationId xmlns:a16="http://schemas.microsoft.com/office/drawing/2014/main" id="{E857B5D3-CCC1-A009-1927-11808D7B3A76}"/>
+              </a:ext>
+            </a:extLst>
+          </p:cNvPr>
+          <p:cNvSpPr txBox="1"/>
+          <p:nvPr/>
+        </p:nvSpPr>
+        <p:spPr>
+          <a:xfrm>
+            <a:off x="1480067" y="2695737"/>
+            <a:ext cx="9231951" cy="923330"/>
+          </a:xfrm>
+          <a:prstGeom prst="rect">
+            <a:avLst/>
+          </a:prstGeom>
+          <a:noFill/>
+        </p:spPr>
+        <p:txBody>
+          <a:bodyPr wrap="none" rtlCol="0">
+            <a:spAutoFit/>
+          </a:bodyPr>
+          <a:lstStyle/>
+          <a:p>
+            <a:r>
+              <a:rPr lang="en-US" altLang="ko-KR" dirty="0"/>
+              <a:t>② </a:t>
+            </a:r>
+            <a:r>
+              <a:rPr lang="ko-KR" altLang="en-US" dirty="0"/>
+              <a:t>작업물이 아직 </a:t>
+            </a:r>
+            <a:r>
+              <a:rPr lang="en-US" altLang="ko-KR" dirty="0"/>
+              <a:t>main branch</a:t>
+            </a:r>
+            <a:r>
+              <a:rPr lang="ko-KR" altLang="en-US" dirty="0"/>
+              <a:t>에 </a:t>
+            </a:r>
+            <a:r>
+              <a:rPr lang="en-US" altLang="ko-KR" dirty="0"/>
+              <a:t>merge</a:t>
+            </a:r>
+            <a:r>
+              <a:rPr lang="ko-KR" altLang="en-US" dirty="0"/>
+              <a:t>되지 않았을 때는 그냥 </a:t>
+            </a:r>
+            <a:r>
+              <a:rPr lang="en-US" altLang="ko-KR" dirty="0"/>
+              <a:t>branch</a:t>
+            </a:r>
+            <a:r>
+              <a:rPr lang="ko-KR" altLang="en-US" dirty="0"/>
+              <a:t>를 삭제할 수 없고</a:t>
+            </a:r>
+            <a:endParaRPr lang="en-US" altLang="ko-KR" dirty="0"/>
+          </a:p>
+          <a:p>
+            <a:r>
+              <a:rPr lang="en-US" altLang="ko-KR" dirty="0"/>
+              <a:t>    </a:t>
+            </a:r>
+            <a:r>
+              <a:rPr lang="ko-KR" altLang="en-US" dirty="0"/>
+              <a:t>강제 삭제를 통해 </a:t>
+            </a:r>
+            <a:r>
+              <a:rPr lang="en-US" altLang="ko-KR" dirty="0"/>
+              <a:t>branch </a:t>
+            </a:r>
+            <a:r>
+              <a:rPr lang="ko-KR" altLang="en-US" dirty="0"/>
+              <a:t>삭제가 가능하다</a:t>
+            </a:r>
+            <a:r>
+              <a:rPr lang="en-US" altLang="ko-KR" dirty="0"/>
+              <a:t>.</a:t>
+            </a:r>
+            <a:r>
+              <a:rPr lang="ko-KR" altLang="en-US" dirty="0"/>
+              <a:t> 이 때 </a:t>
+            </a:r>
+            <a:r>
+              <a:rPr lang="en-US" altLang="ko-KR" dirty="0"/>
+              <a:t>main</a:t>
+            </a:r>
+            <a:r>
+              <a:rPr lang="ko-KR" altLang="en-US" dirty="0"/>
+              <a:t> </a:t>
+            </a:r>
+            <a:r>
+              <a:rPr lang="en-US" altLang="ko-KR" dirty="0"/>
+              <a:t>branch</a:t>
+            </a:r>
+            <a:r>
+              <a:rPr lang="ko-KR" altLang="en-US" dirty="0"/>
+              <a:t>에 </a:t>
+            </a:r>
+            <a:r>
+              <a:rPr lang="en-US" altLang="ko-KR" dirty="0"/>
+              <a:t>merge</a:t>
+            </a:r>
+            <a:r>
+              <a:rPr lang="ko-KR" altLang="en-US" dirty="0"/>
+              <a:t>되지 않은</a:t>
+            </a:r>
+            <a:endParaRPr lang="en-US" altLang="ko-KR" dirty="0"/>
+          </a:p>
+          <a:p>
+            <a:r>
+              <a:rPr lang="ko-KR" altLang="en-US" dirty="0"/>
+              <a:t>    </a:t>
+            </a:r>
+            <a:r>
+              <a:rPr lang="en-US" altLang="ko-KR" dirty="0"/>
+              <a:t>commit</a:t>
+            </a:r>
+            <a:r>
+              <a:rPr lang="ko-KR" altLang="en-US" dirty="0"/>
+              <a:t>은 모두 삭제되므로 주의가 필요하다</a:t>
+            </a:r>
+            <a:r>
+              <a:rPr lang="en-US" altLang="ko-KR" dirty="0"/>
+              <a:t>.</a:t>
+            </a:r>
+          </a:p>
+        </p:txBody>
+      </p:sp>
+    </p:spTree>
+    <p:extLst>
+      <p:ext uri="{BB962C8B-B14F-4D97-AF65-F5344CB8AC3E}">
+        <p14:creationId xmlns:p14="http://schemas.microsoft.com/office/powerpoint/2010/main" val="1886429487"/>
+      </p:ext>
+    </p:extLst>
+  </p:cSld>
+  <p:clrMapOvr>
+    <a:masterClrMapping/>
+  </p:clrMapOvr>
+</p:sld>
+</file>
+
+<file path=ppt/slides/slide33.xml><?xml version="1.0" encoding="utf-8"?>
+<p:sld xmlns:a="http://schemas.openxmlformats.org/drawingml/2006/main" xmlns:r="http://schemas.openxmlformats.org/officeDocument/2006/relationships" xmlns:p="http://schemas.openxmlformats.org/presentationml/2006/main">
+  <p:cSld>
+    <p:spTree>
+      <p:nvGrpSpPr>
+        <p:cNvPr id="1" name=""/>
+        <p:cNvGrpSpPr/>
+        <p:nvPr/>
+      </p:nvGrpSpPr>
+      <p:grpSpPr>
+        <a:xfrm>
+          <a:off x="0" y="0"/>
+          <a:ext cx="0" cy="0"/>
+          <a:chOff x="0" y="0"/>
+          <a:chExt cx="0" cy="0"/>
+        </a:xfrm>
+      </p:grpSpPr>
+      <p:sp>
+        <p:nvSpPr>
           <p:cNvPr id="4" name="TextBox 3">
             <a:extLst>
               <a:ext uri="{FF2B5EF4-FFF2-40B4-BE49-F238E27FC236}">
@@ -12317,7 +12640,7 @@
 </p:sld>
 </file>
 
-<file path=ppt/slides/slide33.xml><?xml version="1.0" encoding="utf-8"?>
+<file path=ppt/slides/slide34.xml><?xml version="1.0" encoding="utf-8"?>
 <p:sld xmlns:a="http://schemas.openxmlformats.org/drawingml/2006/main" xmlns:r="http://schemas.openxmlformats.org/officeDocument/2006/relationships" xmlns:p="http://schemas.openxmlformats.org/presentationml/2006/main">
   <p:cSld>
     <p:spTree>
@@ -12679,203 +13002,6 @@
 </p:sld>
 </file>
 
-<file path=ppt/slides/slide34.xml><?xml version="1.0" encoding="utf-8"?>
-<p:sld xmlns:a="http://schemas.openxmlformats.org/drawingml/2006/main" xmlns:r="http://schemas.openxmlformats.org/officeDocument/2006/relationships" xmlns:p="http://schemas.openxmlformats.org/presentationml/2006/main">
-  <p:cSld>
-    <p:spTree>
-      <p:nvGrpSpPr>
-        <p:cNvPr id="1" name=""/>
-        <p:cNvGrpSpPr/>
-        <p:nvPr/>
-      </p:nvGrpSpPr>
-      <p:grpSpPr>
-        <a:xfrm>
-          <a:off x="0" y="0"/>
-          <a:ext cx="0" cy="0"/>
-          <a:chOff x="0" y="0"/>
-          <a:chExt cx="0" cy="0"/>
-        </a:xfrm>
-      </p:grpSpPr>
-      <p:sp>
-        <p:nvSpPr>
-          <p:cNvPr id="6" name="TextBox 5">
-            <a:extLst>
-              <a:ext uri="{FF2B5EF4-FFF2-40B4-BE49-F238E27FC236}">
-                <a16:creationId xmlns:a16="http://schemas.microsoft.com/office/drawing/2014/main" id="{F6147AD3-740E-DA09-22B6-43F39FF02B80}"/>
-              </a:ext>
-            </a:extLst>
-          </p:cNvPr>
-          <p:cNvSpPr txBox="1"/>
-          <p:nvPr/>
-        </p:nvSpPr>
-        <p:spPr>
-          <a:xfrm>
-            <a:off x="3314261" y="270561"/>
-            <a:ext cx="5563511" cy="584775"/>
-          </a:xfrm>
-          <a:prstGeom prst="rect">
-            <a:avLst/>
-          </a:prstGeom>
-          <a:noFill/>
-        </p:spPr>
-        <p:txBody>
-          <a:bodyPr wrap="none" rtlCol="0" anchor="ctr">
-            <a:spAutoFit/>
-          </a:bodyPr>
-          <a:lstStyle/>
-          <a:p>
-            <a:pPr algn="ctr"/>
-            <a:r>
-              <a:rPr lang="en-US" altLang="ko-KR" sz="3200" dirty="0"/>
-              <a:t>[branch checkout conflict</a:t>
-            </a:r>
-            <a:r>
-              <a:rPr lang="ko-KR" altLang="en-US" sz="3200" dirty="0">
-                <a:latin typeface="맑은 고딕" panose="020B0503020000020004" pitchFamily="50" charset="-127"/>
-                <a:ea typeface="맑은 고딕" panose="020B0503020000020004" pitchFamily="50" charset="-127"/>
-              </a:rPr>
-              <a:t> ①</a:t>
-            </a:r>
-            <a:r>
-              <a:rPr lang="en-US" altLang="ko-KR" sz="3200" dirty="0"/>
-              <a:t>]</a:t>
-            </a:r>
-          </a:p>
-        </p:txBody>
-      </p:sp>
-      <p:sp>
-        <p:nvSpPr>
-          <p:cNvPr id="13" name="TextBox 12">
-            <a:extLst>
-              <a:ext uri="{FF2B5EF4-FFF2-40B4-BE49-F238E27FC236}">
-                <a16:creationId xmlns:a16="http://schemas.microsoft.com/office/drawing/2014/main" id="{7151BDEC-CC25-7CFB-D7ED-6DC559CFA940}"/>
-              </a:ext>
-            </a:extLst>
-          </p:cNvPr>
-          <p:cNvSpPr txBox="1"/>
-          <p:nvPr/>
-        </p:nvSpPr>
-        <p:spPr>
-          <a:xfrm>
-            <a:off x="2223103" y="5941108"/>
-            <a:ext cx="7745903" cy="369332"/>
-          </a:xfrm>
-          <a:prstGeom prst="rect">
-            <a:avLst/>
-          </a:prstGeom>
-          <a:noFill/>
-        </p:spPr>
-        <p:txBody>
-          <a:bodyPr wrap="none" rtlCol="0">
-            <a:spAutoFit/>
-          </a:bodyPr>
-          <a:lstStyle/>
-          <a:p>
-            <a:pPr algn="ctr"/>
-            <a:r>
-              <a:rPr lang="en-US" altLang="ko-KR" dirty="0" err="1"/>
-              <a:t>nsh</a:t>
-            </a:r>
-            <a:r>
-              <a:rPr lang="ko-KR" altLang="en-US" dirty="0"/>
-              <a:t> </a:t>
-            </a:r>
-            <a:r>
-              <a:rPr lang="ko-KR" altLang="en-US" dirty="0" err="1"/>
-              <a:t>브랜치</a:t>
-            </a:r>
-            <a:r>
-              <a:rPr lang="ko-KR" altLang="en-US" dirty="0"/>
-              <a:t> 기준으로 기존에 없던 파일이므로 </a:t>
-            </a:r>
-            <a:r>
-              <a:rPr lang="en-US" altLang="ko-KR" dirty="0"/>
-              <a:t>untracked</a:t>
-            </a:r>
-            <a:r>
-              <a:rPr lang="ko-KR" altLang="en-US" dirty="0"/>
-              <a:t>상태로 노출된다</a:t>
-            </a:r>
-            <a:r>
-              <a:rPr lang="en-US" altLang="ko-KR" dirty="0"/>
-              <a:t>.</a:t>
-            </a:r>
-          </a:p>
-        </p:txBody>
-      </p:sp>
-      <p:pic>
-        <p:nvPicPr>
-          <p:cNvPr id="3" name="그림 2">
-            <a:extLst>
-              <a:ext uri="{FF2B5EF4-FFF2-40B4-BE49-F238E27FC236}">
-                <a16:creationId xmlns:a16="http://schemas.microsoft.com/office/drawing/2014/main" id="{65113DED-C906-EAF4-AAF1-80882BC990C8}"/>
-              </a:ext>
-            </a:extLst>
-          </p:cNvPr>
-          <p:cNvPicPr>
-            <a:picLocks noChangeAspect="1"/>
-          </p:cNvPicPr>
-          <p:nvPr/>
-        </p:nvPicPr>
-        <p:blipFill>
-          <a:blip r:embed="rId2"/>
-          <a:stretch>
-            <a:fillRect/>
-          </a:stretch>
-        </p:blipFill>
-        <p:spPr>
-          <a:xfrm>
-            <a:off x="1974037" y="2603457"/>
-            <a:ext cx="2895749" cy="1651085"/>
-          </a:xfrm>
-          <a:prstGeom prst="rect">
-            <a:avLst/>
-          </a:prstGeom>
-        </p:spPr>
-      </p:pic>
-      <p:pic>
-        <p:nvPicPr>
-          <p:cNvPr id="9" name="그림 8">
-            <a:extLst>
-              <a:ext uri="{FF2B5EF4-FFF2-40B4-BE49-F238E27FC236}">
-                <a16:creationId xmlns:a16="http://schemas.microsoft.com/office/drawing/2014/main" id="{98AA9FDF-D922-1E1A-64BE-8AE87A8ED0C2}"/>
-              </a:ext>
-            </a:extLst>
-          </p:cNvPr>
-          <p:cNvPicPr>
-            <a:picLocks noChangeAspect="1"/>
-          </p:cNvPicPr>
-          <p:nvPr/>
-        </p:nvPicPr>
-        <p:blipFill>
-          <a:blip r:embed="rId3"/>
-          <a:stretch>
-            <a:fillRect/>
-          </a:stretch>
-        </p:blipFill>
-        <p:spPr>
-          <a:xfrm>
-            <a:off x="5741581" y="1475852"/>
-            <a:ext cx="5366944" cy="3906296"/>
-          </a:xfrm>
-          <a:prstGeom prst="rect">
-            <a:avLst/>
-          </a:prstGeom>
-        </p:spPr>
-      </p:pic>
-    </p:spTree>
-    <p:extLst>
-      <p:ext uri="{BB962C8B-B14F-4D97-AF65-F5344CB8AC3E}">
-        <p14:creationId xmlns:p14="http://schemas.microsoft.com/office/powerpoint/2010/main" val="1762457489"/>
-      </p:ext>
-    </p:extLst>
-  </p:cSld>
-  <p:clrMapOvr>
-    <a:masterClrMapping/>
-  </p:clrMapOvr>
-</p:sld>
-</file>
-
 <file path=ppt/slides/slide35.xml><?xml version="1.0" encoding="utf-8"?>
 <p:sld xmlns:a="http://schemas.openxmlformats.org/drawingml/2006/main" xmlns:r="http://schemas.openxmlformats.org/officeDocument/2006/relationships" xmlns:p="http://schemas.openxmlformats.org/presentationml/2006/main">
   <p:cSld>
@@ -12954,8 +13080,8 @@
         </p:nvSpPr>
         <p:spPr>
           <a:xfrm>
-            <a:off x="3823643" y="5941108"/>
-            <a:ext cx="4544834" cy="369332"/>
+            <a:off x="2223103" y="5941108"/>
+            <a:ext cx="7745903" cy="369332"/>
           </a:xfrm>
           <a:prstGeom prst="rect">
             <a:avLst/>
@@ -12970,24 +13096,32 @@
           <a:p>
             <a:pPr algn="ctr"/>
             <a:r>
+              <a:rPr lang="en-US" altLang="ko-KR" dirty="0" err="1"/>
+              <a:t>nsh</a:t>
+            </a:r>
+            <a:r>
               <a:rPr lang="ko-KR" altLang="en-US" dirty="0"/>
-              <a:t>해당 상태에서 </a:t>
-            </a:r>
-            <a:r>
-              <a:rPr lang="en-US" altLang="ko-KR" dirty="0" err="1"/>
-              <a:t>hdh</a:t>
+              <a:t> </a:t>
             </a:r>
             <a:r>
               <a:rPr lang="ko-KR" altLang="en-US" dirty="0" err="1"/>
-              <a:t>브랜치로</a:t>
+              <a:t>브랜치</a:t>
             </a:r>
             <a:r>
               <a:rPr lang="ko-KR" altLang="en-US" dirty="0"/>
-              <a:t> 이동한다면</a:t>
+              <a:t> 기준으로 기존에 없던 파일이므로 </a:t>
             </a:r>
             <a:r>
               <a:rPr lang="en-US" altLang="ko-KR" dirty="0"/>
-              <a:t>?</a:t>
+              <a:t>untracked</a:t>
+            </a:r>
+            <a:r>
+              <a:rPr lang="ko-KR" altLang="en-US" dirty="0"/>
+              <a:t>상태로 노출된다</a:t>
+            </a:r>
+            <a:r>
+              <a:rPr lang="en-US" altLang="ko-KR" dirty="0"/>
+              <a:t>.</a:t>
             </a:r>
           </a:p>
         </p:txBody>
@@ -13055,7 +13189,7 @@
     </p:spTree>
     <p:extLst>
       <p:ext uri="{BB962C8B-B14F-4D97-AF65-F5344CB8AC3E}">
-        <p14:creationId xmlns:p14="http://schemas.microsoft.com/office/powerpoint/2010/main" val="2304874017"/>
+        <p14:creationId xmlns:p14="http://schemas.microsoft.com/office/powerpoint/2010/main" val="1762457489"/>
       </p:ext>
     </p:extLst>
   </p:cSld>
@@ -13143,8 +13277,8 @@
         </p:nvSpPr>
         <p:spPr>
           <a:xfrm>
-            <a:off x="440663" y="5632764"/>
-            <a:ext cx="11310853" cy="369332"/>
+            <a:off x="3823643" y="5941108"/>
+            <a:ext cx="4544834" cy="369332"/>
           </a:xfrm>
           <a:prstGeom prst="rect">
             <a:avLst/>
@@ -13160,58 +13294,33 @@
             <a:pPr algn="ctr"/>
             <a:r>
               <a:rPr lang="ko-KR" altLang="en-US" dirty="0"/>
-              <a:t>현재 </a:t>
+              <a:t>해당 상태에서 </a:t>
+            </a:r>
+            <a:r>
+              <a:rPr lang="en-US" altLang="ko-KR" dirty="0" err="1"/>
+              <a:t>hdh</a:t>
+            </a:r>
+            <a:r>
+              <a:rPr lang="ko-KR" altLang="en-US" dirty="0" err="1"/>
+              <a:t>브랜치로</a:t>
+            </a:r>
+            <a:r>
+              <a:rPr lang="ko-KR" altLang="en-US" dirty="0"/>
+              <a:t> 이동한다면</a:t>
             </a:r>
             <a:r>
               <a:rPr lang="en-US" altLang="ko-KR" dirty="0"/>
-              <a:t>branch</a:t>
-            </a:r>
-            <a:r>
-              <a:rPr lang="ko-KR" altLang="en-US" dirty="0"/>
-              <a:t>의</a:t>
-            </a:r>
-            <a:r>
-              <a:rPr lang="en-US" altLang="ko-KR" dirty="0"/>
-              <a:t> untracked </a:t>
-            </a:r>
-            <a:r>
-              <a:rPr lang="ko-KR" altLang="en-US" dirty="0"/>
-              <a:t>파일과 동일한 경로에 동일한 파일명이 존재하는 </a:t>
-            </a:r>
-            <a:r>
-              <a:rPr lang="en-US" altLang="ko-KR" dirty="0"/>
-              <a:t>branch</a:t>
-            </a:r>
-            <a:r>
-              <a:rPr lang="ko-KR" altLang="en-US" dirty="0"/>
-              <a:t>로는 </a:t>
-            </a:r>
-            <a:r>
-              <a:rPr lang="en-US" altLang="ko-KR" dirty="0"/>
-              <a:t>checkout</a:t>
-            </a:r>
-            <a:r>
-              <a:rPr lang="ko-KR" altLang="en-US" dirty="0"/>
-              <a:t>할 수 없다</a:t>
-            </a:r>
-            <a:r>
-              <a:rPr lang="en-US" altLang="ko-KR" dirty="0"/>
-              <a:t>.</a:t>
-            </a:r>
-            <a:r>
-              <a:rPr lang="ko-KR" altLang="en-US" dirty="0"/>
-              <a:t> </a:t>
-            </a:r>
-            <a:endParaRPr lang="en-US" altLang="ko-KR" dirty="0"/>
+              <a:t>?</a:t>
+            </a:r>
           </a:p>
         </p:txBody>
       </p:sp>
       <p:pic>
         <p:nvPicPr>
-          <p:cNvPr id="4" name="그림 3">
-            <a:extLst>
-              <a:ext uri="{FF2B5EF4-FFF2-40B4-BE49-F238E27FC236}">
-                <a16:creationId xmlns:a16="http://schemas.microsoft.com/office/drawing/2014/main" id="{8410559F-4737-DE5D-4991-9FC1F0AB261E}"/>
+          <p:cNvPr id="3" name="그림 2">
+            <a:extLst>
+              <a:ext uri="{FF2B5EF4-FFF2-40B4-BE49-F238E27FC236}">
+                <a16:creationId xmlns:a16="http://schemas.microsoft.com/office/drawing/2014/main" id="{65113DED-C906-EAF4-AAF1-80882BC990C8}"/>
               </a:ext>
             </a:extLst>
           </p:cNvPr>
@@ -13228,8 +13337,38 @@
         </p:blipFill>
         <p:spPr>
           <a:xfrm>
-            <a:off x="2403285" y="1974775"/>
-            <a:ext cx="7385430" cy="2908449"/>
+            <a:off x="1974037" y="2603457"/>
+            <a:ext cx="2895749" cy="1651085"/>
+          </a:xfrm>
+          <a:prstGeom prst="rect">
+            <a:avLst/>
+          </a:prstGeom>
+        </p:spPr>
+      </p:pic>
+      <p:pic>
+        <p:nvPicPr>
+          <p:cNvPr id="9" name="그림 8">
+            <a:extLst>
+              <a:ext uri="{FF2B5EF4-FFF2-40B4-BE49-F238E27FC236}">
+                <a16:creationId xmlns:a16="http://schemas.microsoft.com/office/drawing/2014/main" id="{98AA9FDF-D922-1E1A-64BE-8AE87A8ED0C2}"/>
+              </a:ext>
+            </a:extLst>
+          </p:cNvPr>
+          <p:cNvPicPr>
+            <a:picLocks noChangeAspect="1"/>
+          </p:cNvPicPr>
+          <p:nvPr/>
+        </p:nvPicPr>
+        <p:blipFill>
+          <a:blip r:embed="rId3"/>
+          <a:stretch>
+            <a:fillRect/>
+          </a:stretch>
+        </p:blipFill>
+        <p:spPr>
+          <a:xfrm>
+            <a:off x="5741581" y="1475852"/>
+            <a:ext cx="5366944" cy="3906296"/>
           </a:xfrm>
           <a:prstGeom prst="rect">
             <a:avLst/>
@@ -13239,7 +13378,7 @@
     </p:spTree>
     <p:extLst>
       <p:ext uri="{BB962C8B-B14F-4D97-AF65-F5344CB8AC3E}">
-        <p14:creationId xmlns:p14="http://schemas.microsoft.com/office/powerpoint/2010/main" val="914735427"/>
+        <p14:creationId xmlns:p14="http://schemas.microsoft.com/office/powerpoint/2010/main" val="2304874017"/>
       </p:ext>
     </p:extLst>
   </p:cSld>
@@ -13327,8 +13466,8 @@
         </p:nvSpPr>
         <p:spPr>
           <a:xfrm>
-            <a:off x="2285662" y="5632764"/>
-            <a:ext cx="7620869" cy="646331"/>
+            <a:off x="440663" y="5632764"/>
+            <a:ext cx="11310853" cy="369332"/>
           </a:xfrm>
           <a:prstGeom prst="rect">
             <a:avLst/>
@@ -13343,28 +13482,8 @@
           <a:p>
             <a:pPr algn="ctr"/>
             <a:r>
-              <a:rPr lang="en-US" altLang="ko-KR" dirty="0"/>
-              <a:t>untracked</a:t>
-            </a:r>
-            <a:r>
               <a:rPr lang="ko-KR" altLang="en-US" dirty="0"/>
-              <a:t>상태의 파일을 </a:t>
-            </a:r>
-            <a:r>
-              <a:rPr lang="en-US" altLang="ko-KR" dirty="0"/>
-              <a:t>commit</a:t>
-            </a:r>
-            <a:r>
-              <a:rPr lang="ko-KR" altLang="en-US" dirty="0"/>
-              <a:t>하거나 삭제해야</a:t>
-            </a:r>
-            <a:endParaRPr lang="en-US" altLang="ko-KR" dirty="0"/>
-          </a:p>
-          <a:p>
-            <a:pPr algn="ctr"/>
-            <a:r>
-              <a:rPr lang="ko-KR" altLang="en-US" dirty="0"/>
-              <a:t>동일한 경로에 동일한 파일명이 존재하는 </a:t>
+              <a:t>현재 </a:t>
             </a:r>
             <a:r>
               <a:rPr lang="en-US" altLang="ko-KR" dirty="0"/>
@@ -13372,29 +13491,50 @@
             </a:r>
             <a:r>
               <a:rPr lang="ko-KR" altLang="en-US" dirty="0"/>
-              <a:t>로</a:t>
+              <a:t>의</a:t>
             </a:r>
             <a:r>
               <a:rPr lang="en-US" altLang="ko-KR" dirty="0"/>
-              <a:t> checkout</a:t>
+              <a:t> untracked </a:t>
             </a:r>
             <a:r>
               <a:rPr lang="ko-KR" altLang="en-US" dirty="0"/>
-              <a:t>할 수 있다</a:t>
+              <a:t>파일과 동일한 경로에 동일한 파일명이 존재하는 </a:t>
+            </a:r>
+            <a:r>
+              <a:rPr lang="en-US" altLang="ko-KR" dirty="0"/>
+              <a:t>branch</a:t>
+            </a:r>
+            <a:r>
+              <a:rPr lang="ko-KR" altLang="en-US" dirty="0"/>
+              <a:t>로는 </a:t>
+            </a:r>
+            <a:r>
+              <a:rPr lang="en-US" altLang="ko-KR" dirty="0"/>
+              <a:t>checkout</a:t>
+            </a:r>
+            <a:r>
+              <a:rPr lang="ko-KR" altLang="en-US" dirty="0"/>
+              <a:t>할 수 없다</a:t>
             </a:r>
             <a:r>
               <a:rPr lang="en-US" altLang="ko-KR" dirty="0"/>
               <a:t>.</a:t>
             </a:r>
+            <a:r>
+              <a:rPr lang="ko-KR" altLang="en-US" dirty="0"/>
+              <a:t> </a:t>
+            </a:r>
+            <a:endParaRPr lang="en-US" altLang="ko-KR" dirty="0"/>
           </a:p>
         </p:txBody>
       </p:sp>
       <p:pic>
         <p:nvPicPr>
-          <p:cNvPr id="3" name="그림 2">
-            <a:extLst>
-              <a:ext uri="{FF2B5EF4-FFF2-40B4-BE49-F238E27FC236}">
-                <a16:creationId xmlns:a16="http://schemas.microsoft.com/office/drawing/2014/main" id="{1205284D-2F20-BEB2-9ED4-93D4AEFF7E84}"/>
+          <p:cNvPr id="4" name="그림 3">
+            <a:extLst>
+              <a:ext uri="{FF2B5EF4-FFF2-40B4-BE49-F238E27FC236}">
+                <a16:creationId xmlns:a16="http://schemas.microsoft.com/office/drawing/2014/main" id="{8410559F-4737-DE5D-4991-9FC1F0AB261E}"/>
               </a:ext>
             </a:extLst>
           </p:cNvPr>
@@ -13411,8 +13551,8 @@
         </p:blipFill>
         <p:spPr>
           <a:xfrm>
-            <a:off x="2454088" y="1466749"/>
-            <a:ext cx="7283824" cy="3924502"/>
+            <a:off x="2403285" y="1974775"/>
+            <a:ext cx="7385430" cy="2908449"/>
           </a:xfrm>
           <a:prstGeom prst="rect">
             <a:avLst/>
@@ -13422,7 +13562,7 @@
     </p:spTree>
     <p:extLst>
       <p:ext uri="{BB962C8B-B14F-4D97-AF65-F5344CB8AC3E}">
-        <p14:creationId xmlns:p14="http://schemas.microsoft.com/office/powerpoint/2010/main" val="363654042"/>
+        <p14:creationId xmlns:p14="http://schemas.microsoft.com/office/powerpoint/2010/main" val="914735427"/>
       </p:ext>
     </p:extLst>
   </p:cSld>
@@ -13487,11 +13627,7 @@
                 <a:latin typeface="맑은 고딕" panose="020B0503020000020004" pitchFamily="50" charset="-127"/>
                 <a:ea typeface="맑은 고딕" panose="020B0503020000020004" pitchFamily="50" charset="-127"/>
               </a:rPr>
-              <a:t> </a:t>
-            </a:r>
-            <a:r>
-              <a:rPr lang="ko-KR" altLang="en-US" sz="3200" dirty="0"/>
-              <a:t>②</a:t>
+              <a:t> ①</a:t>
             </a:r>
             <a:r>
               <a:rPr lang="en-US" altLang="ko-KR" sz="3200" dirty="0"/>
@@ -13502,10 +13638,10 @@
       </p:sp>
       <p:sp>
         <p:nvSpPr>
-          <p:cNvPr id="7" name="TextBox 6">
-            <a:extLst>
-              <a:ext uri="{FF2B5EF4-FFF2-40B4-BE49-F238E27FC236}">
-                <a16:creationId xmlns:a16="http://schemas.microsoft.com/office/drawing/2014/main" id="{5AF08BAE-275E-161F-AED4-225B386BD2F3}"/>
+          <p:cNvPr id="13" name="TextBox 12">
+            <a:extLst>
+              <a:ext uri="{FF2B5EF4-FFF2-40B4-BE49-F238E27FC236}">
+                <a16:creationId xmlns:a16="http://schemas.microsoft.com/office/drawing/2014/main" id="{7151BDEC-CC25-7CFB-D7ED-6DC559CFA940}"/>
               </a:ext>
             </a:extLst>
           </p:cNvPr>
@@ -13514,8 +13650,8 @@
         </p:nvSpPr>
         <p:spPr>
           <a:xfrm>
-            <a:off x="2565503" y="2094909"/>
-            <a:ext cx="2608406" cy="369332"/>
+            <a:off x="2285662" y="5632764"/>
+            <a:ext cx="7620869" cy="646331"/>
           </a:xfrm>
           <a:prstGeom prst="rect">
             <a:avLst/>
@@ -13528,154 +13664,50 @@
           </a:bodyPr>
           <a:lstStyle/>
           <a:p>
-            <a:r>
-              <a:rPr lang="en-US" altLang="ko-KR" dirty="0" err="1"/>
-              <a:t>hdh</a:t>
-            </a:r>
+            <a:pPr algn="ctr"/>
             <a:r>
               <a:rPr lang="en-US" altLang="ko-KR" dirty="0"/>
-              <a:t> branch</a:t>
+              <a:t>untracked</a:t>
             </a:r>
             <a:r>
               <a:rPr lang="ko-KR" altLang="en-US" dirty="0"/>
-              <a:t>의 </a:t>
-            </a:r>
-            <a:r>
-              <a:rPr lang="en-US" altLang="ko-KR" dirty="0" err="1"/>
-              <a:t>nsh</a:t>
+              <a:t>상태의 파일을 </a:t>
             </a:r>
             <a:r>
               <a:rPr lang="en-US" altLang="ko-KR" dirty="0"/>
-              <a:t> </a:t>
+              <a:t>commit</a:t>
             </a:r>
             <a:r>
               <a:rPr lang="ko-KR" altLang="en-US" dirty="0"/>
-              <a:t>폴더</a:t>
+              <a:t>하거나 삭제해야</a:t>
             </a:r>
             <a:endParaRPr lang="en-US" altLang="ko-KR" dirty="0"/>
           </a:p>
-        </p:txBody>
-      </p:sp>
-      <p:sp>
-        <p:nvSpPr>
-          <p:cNvPr id="11" name="TextBox 10">
-            <a:extLst>
-              <a:ext uri="{FF2B5EF4-FFF2-40B4-BE49-F238E27FC236}">
-                <a16:creationId xmlns:a16="http://schemas.microsoft.com/office/drawing/2014/main" id="{9E96107D-C6B5-687B-A133-CE8827C99E99}"/>
-              </a:ext>
-            </a:extLst>
-          </p:cNvPr>
-          <p:cNvSpPr txBox="1"/>
-          <p:nvPr/>
-        </p:nvSpPr>
-        <p:spPr>
-          <a:xfrm>
-            <a:off x="6800806" y="2094909"/>
-            <a:ext cx="2568332" cy="369332"/>
-          </a:xfrm>
-          <a:prstGeom prst="rect">
-            <a:avLst/>
-          </a:prstGeom>
-          <a:noFill/>
-        </p:spPr>
-        <p:txBody>
-          <a:bodyPr wrap="none" rtlCol="0">
-            <a:spAutoFit/>
-          </a:bodyPr>
-          <a:lstStyle/>
-          <a:p>
-            <a:r>
-              <a:rPr lang="en-US" altLang="ko-KR" dirty="0" err="1"/>
-              <a:t>nsh</a:t>
+          <a:p>
+            <a:pPr algn="ctr"/>
+            <a:r>
+              <a:rPr lang="ko-KR" altLang="en-US" dirty="0"/>
+              <a:t>동일한 경로에 동일한 파일명이 존재하는 </a:t>
             </a:r>
             <a:r>
               <a:rPr lang="en-US" altLang="ko-KR" dirty="0"/>
-              <a:t> branch</a:t>
+              <a:t>branch</a:t>
             </a:r>
             <a:r>
               <a:rPr lang="ko-KR" altLang="en-US" dirty="0"/>
-              <a:t>의 </a:t>
-            </a:r>
-            <a:r>
-              <a:rPr lang="en-US" altLang="ko-KR" dirty="0" err="1"/>
-              <a:t>nsh</a:t>
+              <a:t>로</a:t>
             </a:r>
             <a:r>
               <a:rPr lang="en-US" altLang="ko-KR" dirty="0"/>
-              <a:t> </a:t>
+              <a:t> checkout</a:t>
             </a:r>
             <a:r>
               <a:rPr lang="ko-KR" altLang="en-US" dirty="0"/>
-              <a:t>폴더</a:t>
-            </a:r>
-            <a:endParaRPr lang="en-US" altLang="ko-KR" dirty="0"/>
-          </a:p>
-        </p:txBody>
-      </p:sp>
-      <p:sp>
-        <p:nvSpPr>
-          <p:cNvPr id="13" name="TextBox 12">
-            <a:extLst>
-              <a:ext uri="{FF2B5EF4-FFF2-40B4-BE49-F238E27FC236}">
-                <a16:creationId xmlns:a16="http://schemas.microsoft.com/office/drawing/2014/main" id="{7151BDEC-CC25-7CFB-D7ED-6DC559CFA940}"/>
-              </a:ext>
-            </a:extLst>
-          </p:cNvPr>
-          <p:cNvSpPr txBox="1"/>
-          <p:nvPr/>
-        </p:nvSpPr>
-        <p:spPr>
-          <a:xfrm>
-            <a:off x="2975385" y="5941108"/>
-            <a:ext cx="6241324" cy="369332"/>
-          </a:xfrm>
-          <a:prstGeom prst="rect">
-            <a:avLst/>
-          </a:prstGeom>
-          <a:noFill/>
-        </p:spPr>
-        <p:txBody>
-          <a:bodyPr wrap="none" rtlCol="0">
-            <a:spAutoFit/>
-          </a:bodyPr>
-          <a:lstStyle/>
-          <a:p>
-            <a:pPr algn="ctr"/>
-            <a:r>
-              <a:rPr lang="en-US" altLang="ko-KR" dirty="0" err="1"/>
-              <a:t>nsh</a:t>
+              <a:t>할 수 있다</a:t>
             </a:r>
             <a:r>
               <a:rPr lang="en-US" altLang="ko-KR" dirty="0"/>
-              <a:t> branch</a:t>
-            </a:r>
-            <a:r>
-              <a:rPr lang="ko-KR" altLang="en-US" dirty="0"/>
-              <a:t>의 </a:t>
-            </a:r>
-            <a:r>
-              <a:rPr lang="en-US" altLang="ko-KR" dirty="0" err="1"/>
-              <a:t>nsh</a:t>
-            </a:r>
-            <a:r>
-              <a:rPr lang="en-US" altLang="ko-KR" dirty="0"/>
-              <a:t> </a:t>
-            </a:r>
-            <a:r>
-              <a:rPr lang="ko-KR" altLang="en-US" dirty="0"/>
-              <a:t>폴더에 </a:t>
-            </a:r>
-            <a:r>
-              <a:rPr lang="en-US" altLang="ko-KR" dirty="0"/>
-              <a:t>ReverseArray.java</a:t>
-            </a:r>
-            <a:r>
-              <a:rPr lang="ko-KR" altLang="en-US" dirty="0"/>
-              <a:t>를 수정한다면</a:t>
-            </a:r>
-            <a:r>
-              <a:rPr lang="en-US" altLang="ko-KR" dirty="0"/>
-              <a:t>?</a:t>
+              <a:t>.</a:t>
             </a:r>
           </a:p>
         </p:txBody>
@@ -13685,7 +13717,7 @@
           <p:cNvPr id="3" name="그림 2">
             <a:extLst>
               <a:ext uri="{FF2B5EF4-FFF2-40B4-BE49-F238E27FC236}">
-                <a16:creationId xmlns:a16="http://schemas.microsoft.com/office/drawing/2014/main" id="{614D5AE3-6C34-8381-1991-4AC96B81F18B}"/>
+                <a16:creationId xmlns:a16="http://schemas.microsoft.com/office/drawing/2014/main" id="{1205284D-2F20-BEB2-9ED4-93D4AEFF7E84}"/>
               </a:ext>
             </a:extLst>
           </p:cNvPr>
@@ -13702,38 +13734,8 @@
         </p:blipFill>
         <p:spPr>
           <a:xfrm>
-            <a:off x="2262187" y="2518908"/>
-            <a:ext cx="3225966" cy="1016052"/>
-          </a:xfrm>
-          <a:prstGeom prst="rect">
-            <a:avLst/>
-          </a:prstGeom>
-        </p:spPr>
-      </p:pic>
-      <p:pic>
-        <p:nvPicPr>
-          <p:cNvPr id="15" name="그림 14">
-            <a:extLst>
-              <a:ext uri="{FF2B5EF4-FFF2-40B4-BE49-F238E27FC236}">
-                <a16:creationId xmlns:a16="http://schemas.microsoft.com/office/drawing/2014/main" id="{65E313B3-A37B-CCCF-D4D5-0AEEB337F8A2}"/>
-              </a:ext>
-            </a:extLst>
-          </p:cNvPr>
-          <p:cNvPicPr>
-            <a:picLocks noChangeAspect="1"/>
-          </p:cNvPicPr>
-          <p:nvPr/>
-        </p:nvPicPr>
-        <p:blipFill>
-          <a:blip r:embed="rId3"/>
-          <a:stretch>
-            <a:fillRect/>
-          </a:stretch>
-        </p:blipFill>
-        <p:spPr>
-          <a:xfrm>
-            <a:off x="6630747" y="2546304"/>
-            <a:ext cx="2908449" cy="1765391"/>
+            <a:off x="2454088" y="1466749"/>
+            <a:ext cx="7283824" cy="3924502"/>
           </a:xfrm>
           <a:prstGeom prst="rect">
             <a:avLst/>
@@ -13743,7 +13745,7 @@
     </p:spTree>
     <p:extLst>
       <p:ext uri="{BB962C8B-B14F-4D97-AF65-F5344CB8AC3E}">
-        <p14:creationId xmlns:p14="http://schemas.microsoft.com/office/powerpoint/2010/main" val="2509635253"/>
+        <p14:creationId xmlns:p14="http://schemas.microsoft.com/office/powerpoint/2010/main" val="363654042"/>
       </p:ext>
     </p:extLst>
   </p:cSld>
@@ -13823,10 +13825,10 @@
       </p:sp>
       <p:sp>
         <p:nvSpPr>
-          <p:cNvPr id="13" name="TextBox 12">
-            <a:extLst>
-              <a:ext uri="{FF2B5EF4-FFF2-40B4-BE49-F238E27FC236}">
-                <a16:creationId xmlns:a16="http://schemas.microsoft.com/office/drawing/2014/main" id="{7151BDEC-CC25-7CFB-D7ED-6DC559CFA940}"/>
+          <p:cNvPr id="7" name="TextBox 6">
+            <a:extLst>
+              <a:ext uri="{FF2B5EF4-FFF2-40B4-BE49-F238E27FC236}">
+                <a16:creationId xmlns:a16="http://schemas.microsoft.com/office/drawing/2014/main" id="{5AF08BAE-275E-161F-AED4-225B386BD2F3}"/>
               </a:ext>
             </a:extLst>
           </p:cNvPr>
@@ -13835,8 +13837,8 @@
         </p:nvSpPr>
         <p:spPr>
           <a:xfrm>
-            <a:off x="1615503" y="5941108"/>
-            <a:ext cx="8961107" cy="369332"/>
+            <a:off x="2565503" y="2094909"/>
+            <a:ext cx="2608406" cy="369332"/>
           </a:xfrm>
           <a:prstGeom prst="rect">
             <a:avLst/>
@@ -13849,44 +13851,164 @@
           </a:bodyPr>
           <a:lstStyle/>
           <a:p>
-            <a:pPr algn="ctr"/>
+            <a:r>
+              <a:rPr lang="en-US" altLang="ko-KR" dirty="0" err="1"/>
+              <a:t>hdh</a:t>
+            </a:r>
+            <a:r>
+              <a:rPr lang="en-US" altLang="ko-KR" dirty="0"/>
+              <a:t> branch</a:t>
+            </a:r>
+            <a:r>
+              <a:rPr lang="ko-KR" altLang="en-US" dirty="0"/>
+              <a:t>의 </a:t>
+            </a:r>
             <a:r>
               <a:rPr lang="en-US" altLang="ko-KR" dirty="0" err="1"/>
               <a:t>nsh</a:t>
             </a:r>
             <a:r>
+              <a:rPr lang="en-US" altLang="ko-KR" dirty="0"/>
+              <a:t> </a:t>
+            </a:r>
+            <a:r>
               <a:rPr lang="ko-KR" altLang="en-US" dirty="0"/>
+              <a:t>폴더</a:t>
+            </a:r>
+            <a:endParaRPr lang="en-US" altLang="ko-KR" dirty="0"/>
+          </a:p>
+        </p:txBody>
+      </p:sp>
+      <p:sp>
+        <p:nvSpPr>
+          <p:cNvPr id="11" name="TextBox 10">
+            <a:extLst>
+              <a:ext uri="{FF2B5EF4-FFF2-40B4-BE49-F238E27FC236}">
+                <a16:creationId xmlns:a16="http://schemas.microsoft.com/office/drawing/2014/main" id="{9E96107D-C6B5-687B-A133-CE8827C99E99}"/>
+              </a:ext>
+            </a:extLst>
+          </p:cNvPr>
+          <p:cNvSpPr txBox="1"/>
+          <p:nvPr/>
+        </p:nvSpPr>
+        <p:spPr>
+          <a:xfrm>
+            <a:off x="6800806" y="2094909"/>
+            <a:ext cx="2568332" cy="369332"/>
+          </a:xfrm>
+          <a:prstGeom prst="rect">
+            <a:avLst/>
+          </a:prstGeom>
+          <a:noFill/>
+        </p:spPr>
+        <p:txBody>
+          <a:bodyPr wrap="none" rtlCol="0">
+            <a:spAutoFit/>
+          </a:bodyPr>
+          <a:lstStyle/>
+          <a:p>
+            <a:r>
+              <a:rPr lang="en-US" altLang="ko-KR" dirty="0" err="1"/>
+              <a:t>nsh</a:t>
+            </a:r>
+            <a:r>
+              <a:rPr lang="en-US" altLang="ko-KR" dirty="0"/>
+              <a:t> branch</a:t>
+            </a:r>
+            <a:r>
+              <a:rPr lang="ko-KR" altLang="en-US" dirty="0"/>
+              <a:t>의 </a:t>
+            </a:r>
+            <a:r>
+              <a:rPr lang="en-US" altLang="ko-KR" dirty="0" err="1"/>
+              <a:t>nsh</a:t>
+            </a:r>
+            <a:r>
+              <a:rPr lang="en-US" altLang="ko-KR" dirty="0"/>
               <a:t> </a:t>
             </a:r>
             <a:r>
-              <a:rPr lang="ko-KR" altLang="en-US" dirty="0" err="1"/>
-              <a:t>브랜치</a:t>
-            </a:r>
-            <a:r>
               <a:rPr lang="ko-KR" altLang="en-US" dirty="0"/>
-              <a:t> 기준으로 기존에 있던 파일이 수정된 것이므로 </a:t>
+              <a:t>폴더</a:t>
+            </a:r>
+            <a:endParaRPr lang="en-US" altLang="ko-KR" dirty="0"/>
+          </a:p>
+        </p:txBody>
+      </p:sp>
+      <p:sp>
+        <p:nvSpPr>
+          <p:cNvPr id="13" name="TextBox 12">
+            <a:extLst>
+              <a:ext uri="{FF2B5EF4-FFF2-40B4-BE49-F238E27FC236}">
+                <a16:creationId xmlns:a16="http://schemas.microsoft.com/office/drawing/2014/main" id="{7151BDEC-CC25-7CFB-D7ED-6DC559CFA940}"/>
+              </a:ext>
+            </a:extLst>
+          </p:cNvPr>
+          <p:cNvSpPr txBox="1"/>
+          <p:nvPr/>
+        </p:nvSpPr>
+        <p:spPr>
+          <a:xfrm>
+            <a:off x="2975385" y="5941108"/>
+            <a:ext cx="6241324" cy="369332"/>
+          </a:xfrm>
+          <a:prstGeom prst="rect">
+            <a:avLst/>
+          </a:prstGeom>
+          <a:noFill/>
+        </p:spPr>
+        <p:txBody>
+          <a:bodyPr wrap="none" rtlCol="0">
+            <a:spAutoFit/>
+          </a:bodyPr>
+          <a:lstStyle/>
+          <a:p>
+            <a:pPr algn="ctr"/>
+            <a:r>
+              <a:rPr lang="en-US" altLang="ko-KR" dirty="0" err="1"/>
+              <a:t>nsh</a:t>
             </a:r>
             <a:r>
               <a:rPr lang="en-US" altLang="ko-KR" dirty="0"/>
-              <a:t>modified</a:t>
+              <a:t> branch</a:t>
             </a:r>
             <a:r>
               <a:rPr lang="ko-KR" altLang="en-US" dirty="0"/>
-              <a:t>상태로 노출된다</a:t>
+              <a:t>의 </a:t>
+            </a:r>
+            <a:r>
+              <a:rPr lang="en-US" altLang="ko-KR" dirty="0" err="1"/>
+              <a:t>nsh</a:t>
             </a:r>
             <a:r>
               <a:rPr lang="en-US" altLang="ko-KR" dirty="0"/>
-              <a:t>.</a:t>
+              <a:t> </a:t>
+            </a:r>
+            <a:r>
+              <a:rPr lang="ko-KR" altLang="en-US" dirty="0"/>
+              <a:t>폴더에 </a:t>
+            </a:r>
+            <a:r>
+              <a:rPr lang="en-US" altLang="ko-KR" dirty="0"/>
+              <a:t>ReverseArray.java</a:t>
+            </a:r>
+            <a:r>
+              <a:rPr lang="ko-KR" altLang="en-US" dirty="0"/>
+              <a:t>를 수정한다면</a:t>
+            </a:r>
+            <a:r>
+              <a:rPr lang="en-US" altLang="ko-KR" dirty="0"/>
+              <a:t>?</a:t>
             </a:r>
           </a:p>
         </p:txBody>
       </p:sp>
       <p:pic>
         <p:nvPicPr>
-          <p:cNvPr id="4" name="그림 3">
-            <a:extLst>
-              <a:ext uri="{FF2B5EF4-FFF2-40B4-BE49-F238E27FC236}">
-                <a16:creationId xmlns:a16="http://schemas.microsoft.com/office/drawing/2014/main" id="{AF34D3F7-A466-FBD3-54C7-EF9AAF7027F9}"/>
+          <p:cNvPr id="3" name="그림 2">
+            <a:extLst>
+              <a:ext uri="{FF2B5EF4-FFF2-40B4-BE49-F238E27FC236}">
+                <a16:creationId xmlns:a16="http://schemas.microsoft.com/office/drawing/2014/main" id="{614D5AE3-6C34-8381-1991-4AC96B81F18B}"/>
               </a:ext>
             </a:extLst>
           </p:cNvPr>
@@ -13903,8 +14025,8 @@
         </p:blipFill>
         <p:spPr>
           <a:xfrm>
-            <a:off x="2208466" y="2578056"/>
-            <a:ext cx="3118010" cy="1701887"/>
+            <a:off x="2262187" y="2518908"/>
+            <a:ext cx="3225966" cy="1016052"/>
           </a:xfrm>
           <a:prstGeom prst="rect">
             <a:avLst/>
@@ -13913,10 +14035,10 @@
       </p:pic>
       <p:pic>
         <p:nvPicPr>
-          <p:cNvPr id="7" name="그림 6">
-            <a:extLst>
-              <a:ext uri="{FF2B5EF4-FFF2-40B4-BE49-F238E27FC236}">
-                <a16:creationId xmlns:a16="http://schemas.microsoft.com/office/drawing/2014/main" id="{74487D56-B533-3FA9-96EE-11EA20290ED7}"/>
+          <p:cNvPr id="15" name="그림 14">
+            <a:extLst>
+              <a:ext uri="{FF2B5EF4-FFF2-40B4-BE49-F238E27FC236}">
+                <a16:creationId xmlns:a16="http://schemas.microsoft.com/office/drawing/2014/main" id="{65E313B3-A37B-CCCF-D4D5-0AEEB337F8A2}"/>
               </a:ext>
             </a:extLst>
           </p:cNvPr>
@@ -13933,8 +14055,8 @@
         </p:blipFill>
         <p:spPr>
           <a:xfrm>
-            <a:off x="5824228" y="1501676"/>
-            <a:ext cx="4807197" cy="3854648"/>
+            <a:off x="6630747" y="2546304"/>
+            <a:ext cx="2908449" cy="1765391"/>
           </a:xfrm>
           <a:prstGeom prst="rect">
             <a:avLst/>
@@ -13944,7 +14066,7 @@
     </p:spTree>
     <p:extLst>
       <p:ext uri="{BB962C8B-B14F-4D97-AF65-F5344CB8AC3E}">
-        <p14:creationId xmlns:p14="http://schemas.microsoft.com/office/powerpoint/2010/main" val="2611532730"/>
+        <p14:creationId xmlns:p14="http://schemas.microsoft.com/office/powerpoint/2010/main" val="2509635253"/>
       </p:ext>
     </p:extLst>
   </p:cSld>
@@ -14942,8 +15064,8 @@
         </p:nvSpPr>
         <p:spPr>
           <a:xfrm>
-            <a:off x="3894171" y="5941108"/>
-            <a:ext cx="4403770" cy="369332"/>
+            <a:off x="1615503" y="5941108"/>
+            <a:ext cx="8961107" cy="369332"/>
           </a:xfrm>
           <a:prstGeom prst="rect">
             <a:avLst/>
@@ -14958,24 +15080,32 @@
           <a:p>
             <a:pPr algn="ctr"/>
             <a:r>
+              <a:rPr lang="en-US" altLang="ko-KR" dirty="0" err="1"/>
+              <a:t>nsh</a:t>
+            </a:r>
+            <a:r>
               <a:rPr lang="ko-KR" altLang="en-US" dirty="0"/>
-              <a:t>해당 상태에서 </a:t>
-            </a:r>
-            <a:r>
-              <a:rPr lang="en-US" altLang="ko-KR" dirty="0" err="1"/>
-              <a:t>hdh</a:t>
+              <a:t> </a:t>
             </a:r>
             <a:r>
               <a:rPr lang="ko-KR" altLang="en-US" dirty="0" err="1"/>
-              <a:t>브랜치로</a:t>
+              <a:t>브랜치</a:t>
             </a:r>
             <a:r>
               <a:rPr lang="ko-KR" altLang="en-US" dirty="0"/>
-              <a:t> 이동한다면</a:t>
+              <a:t> 기준으로 기존에 있던 파일이 수정된 것이므로 </a:t>
             </a:r>
             <a:r>
               <a:rPr lang="en-US" altLang="ko-KR" dirty="0"/>
-              <a:t>?</a:t>
+              <a:t>modified</a:t>
+            </a:r>
+            <a:r>
+              <a:rPr lang="ko-KR" altLang="en-US" dirty="0"/>
+              <a:t>상태로 노출된다</a:t>
+            </a:r>
+            <a:r>
+              <a:rPr lang="en-US" altLang="ko-KR" dirty="0"/>
+              <a:t>.</a:t>
             </a:r>
           </a:p>
         </p:txBody>
@@ -15043,7 +15173,7 @@
     </p:spTree>
     <p:extLst>
       <p:ext uri="{BB962C8B-B14F-4D97-AF65-F5344CB8AC3E}">
-        <p14:creationId xmlns:p14="http://schemas.microsoft.com/office/powerpoint/2010/main" val="529960427"/>
+        <p14:creationId xmlns:p14="http://schemas.microsoft.com/office/powerpoint/2010/main" val="2611532730"/>
       </p:ext>
     </p:extLst>
   </p:cSld>
@@ -15135,8 +15265,8 @@
         </p:nvSpPr>
         <p:spPr>
           <a:xfrm>
-            <a:off x="99979" y="5632764"/>
-            <a:ext cx="11992258" cy="646331"/>
+            <a:off x="3894171" y="5941108"/>
+            <a:ext cx="4403770" cy="369332"/>
           </a:xfrm>
           <a:prstGeom prst="rect">
             <a:avLst/>
@@ -15151,105 +15281,34 @@
           <a:p>
             <a:pPr algn="ctr"/>
             <a:r>
-              <a:rPr lang="en-US" altLang="ko-KR" dirty="0" err="1"/>
-              <a:t>nsh</a:t>
-            </a:r>
-            <a:r>
               <a:rPr lang="ko-KR" altLang="en-US" dirty="0"/>
-              <a:t> </a:t>
-            </a:r>
-            <a:r>
-              <a:rPr lang="en-US" altLang="ko-KR" dirty="0"/>
-              <a:t>branch</a:t>
-            </a:r>
-            <a:r>
-              <a:rPr lang="ko-KR" altLang="en-US" dirty="0"/>
-              <a:t>에서는 </a:t>
-            </a:r>
-            <a:r>
-              <a:rPr lang="en-US" altLang="ko-KR" dirty="0"/>
-              <a:t>modified </a:t>
-            </a:r>
-            <a:r>
-              <a:rPr lang="ko-KR" altLang="en-US" dirty="0"/>
-              <a:t>상태이고</a:t>
-            </a:r>
-            <a:r>
-              <a:rPr lang="en-US" altLang="ko-KR" dirty="0"/>
-              <a:t>, </a:t>
+              <a:t>해당 상태에서 </a:t>
             </a:r>
             <a:r>
               <a:rPr lang="en-US" altLang="ko-KR" dirty="0" err="1"/>
               <a:t>hdh</a:t>
             </a:r>
             <a:r>
-              <a:rPr lang="ko-KR" altLang="en-US" dirty="0"/>
-              <a:t> </a:t>
-            </a:r>
-            <a:r>
-              <a:rPr lang="en-US" altLang="ko-KR" dirty="0"/>
-              <a:t>branch</a:t>
-            </a:r>
-            <a:r>
-              <a:rPr lang="ko-KR" altLang="en-US" dirty="0"/>
-              <a:t>에서는 생성된 적도 없는 파일이기 때문에 </a:t>
-            </a:r>
-            <a:r>
-              <a:rPr lang="en-US" altLang="ko-KR" dirty="0"/>
-              <a:t>untracked </a:t>
-            </a:r>
-            <a:r>
-              <a:rPr lang="ko-KR" altLang="en-US" dirty="0"/>
-              <a:t>상태이다</a:t>
-            </a:r>
-            <a:r>
-              <a:rPr lang="en-US" altLang="ko-KR" dirty="0"/>
-              <a:t>.</a:t>
-            </a:r>
-          </a:p>
-          <a:p>
-            <a:pPr algn="ctr"/>
-            <a:r>
-              <a:rPr lang="ko-KR" altLang="en-US" dirty="0"/>
-              <a:t>해당 차이 때문에 </a:t>
-            </a:r>
-            <a:r>
-              <a:rPr lang="en-US" altLang="ko-KR" dirty="0" err="1"/>
-              <a:t>hdh</a:t>
-            </a:r>
-            <a:r>
-              <a:rPr lang="en-US" altLang="ko-KR" dirty="0"/>
-              <a:t> </a:t>
-            </a:r>
-            <a:r>
               <a:rPr lang="ko-KR" altLang="en-US" dirty="0" err="1"/>
               <a:t>브랜치로</a:t>
             </a:r>
             <a:r>
               <a:rPr lang="ko-KR" altLang="en-US" dirty="0"/>
-              <a:t> </a:t>
+              <a:t> 이동한다면</a:t>
             </a:r>
             <a:r>
               <a:rPr lang="en-US" altLang="ko-KR" dirty="0"/>
-              <a:t>checkout</a:t>
-            </a:r>
-            <a:r>
-              <a:rPr lang="ko-KR" altLang="en-US" dirty="0"/>
-              <a:t>할 수 없다</a:t>
-            </a:r>
-            <a:r>
-              <a:rPr lang="en-US" altLang="ko-KR" dirty="0"/>
-              <a:t>.</a:t>
+              <a:t>?</a:t>
             </a:r>
           </a:p>
         </p:txBody>
       </p:sp>
       <p:pic>
         <p:nvPicPr>
-          <p:cNvPr id="5" name="그림 4">
-            <a:extLst>
-              <a:ext uri="{FF2B5EF4-FFF2-40B4-BE49-F238E27FC236}">
-                <a16:creationId xmlns:a16="http://schemas.microsoft.com/office/drawing/2014/main" id="{AB48BBC8-8B79-59C8-D289-B720B566EB07}"/>
+          <p:cNvPr id="4" name="그림 3">
+            <a:extLst>
+              <a:ext uri="{FF2B5EF4-FFF2-40B4-BE49-F238E27FC236}">
+                <a16:creationId xmlns:a16="http://schemas.microsoft.com/office/drawing/2014/main" id="{AF34D3F7-A466-FBD3-54C7-EF9AAF7027F9}"/>
               </a:ext>
             </a:extLst>
           </p:cNvPr>
@@ -15266,8 +15325,38 @@
         </p:blipFill>
         <p:spPr>
           <a:xfrm>
-            <a:off x="2368358" y="2025578"/>
-            <a:ext cx="7455283" cy="2806844"/>
+            <a:off x="2208466" y="2578056"/>
+            <a:ext cx="3118010" cy="1701887"/>
+          </a:xfrm>
+          <a:prstGeom prst="rect">
+            <a:avLst/>
+          </a:prstGeom>
+        </p:spPr>
+      </p:pic>
+      <p:pic>
+        <p:nvPicPr>
+          <p:cNvPr id="7" name="그림 6">
+            <a:extLst>
+              <a:ext uri="{FF2B5EF4-FFF2-40B4-BE49-F238E27FC236}">
+                <a16:creationId xmlns:a16="http://schemas.microsoft.com/office/drawing/2014/main" id="{74487D56-B533-3FA9-96EE-11EA20290ED7}"/>
+              </a:ext>
+            </a:extLst>
+          </p:cNvPr>
+          <p:cNvPicPr>
+            <a:picLocks noChangeAspect="1"/>
+          </p:cNvPicPr>
+          <p:nvPr/>
+        </p:nvPicPr>
+        <p:blipFill>
+          <a:blip r:embed="rId3"/>
+          <a:stretch>
+            <a:fillRect/>
+          </a:stretch>
+        </p:blipFill>
+        <p:spPr>
+          <a:xfrm>
+            <a:off x="5824228" y="1501676"/>
+            <a:ext cx="4807197" cy="3854648"/>
           </a:xfrm>
           <a:prstGeom prst="rect">
             <a:avLst/>
@@ -15277,7 +15366,7 @@
     </p:spTree>
     <p:extLst>
       <p:ext uri="{BB962C8B-B14F-4D97-AF65-F5344CB8AC3E}">
-        <p14:creationId xmlns:p14="http://schemas.microsoft.com/office/powerpoint/2010/main" val="4180734707"/>
+        <p14:creationId xmlns:p14="http://schemas.microsoft.com/office/powerpoint/2010/main" val="529960427"/>
       </p:ext>
     </p:extLst>
   </p:cSld>
@@ -15369,8 +15458,8 @@
         </p:nvSpPr>
         <p:spPr>
           <a:xfrm>
-            <a:off x="2860281" y="5632764"/>
-            <a:ext cx="6471644" cy="369332"/>
+            <a:off x="99979" y="5632764"/>
+            <a:ext cx="11992258" cy="646331"/>
           </a:xfrm>
           <a:prstGeom prst="rect">
             <a:avLst/>
@@ -15385,42 +15474,105 @@
           <a:p>
             <a:pPr algn="ctr"/>
             <a:r>
+              <a:rPr lang="en-US" altLang="ko-KR" dirty="0" err="1"/>
+              <a:t>nsh</a:t>
+            </a:r>
+            <a:r>
+              <a:rPr lang="ko-KR" altLang="en-US" dirty="0"/>
+              <a:t> </a:t>
+            </a:r>
+            <a:r>
               <a:rPr lang="en-US" altLang="ko-KR" dirty="0"/>
-              <a:t>modified</a:t>
+              <a:t>branch</a:t>
             </a:r>
             <a:r>
               <a:rPr lang="ko-KR" altLang="en-US" dirty="0"/>
-              <a:t> 상태는 </a:t>
+              <a:t>에서는 </a:t>
             </a:r>
             <a:r>
               <a:rPr lang="en-US" altLang="ko-KR" dirty="0"/>
-              <a:t>commit</a:t>
+              <a:t>modified </a:t>
             </a:r>
             <a:r>
               <a:rPr lang="ko-KR" altLang="en-US" dirty="0"/>
-              <a:t>하거나 </a:t>
+              <a:t>상태이고</a:t>
             </a:r>
             <a:r>
               <a:rPr lang="en-US" altLang="ko-KR" dirty="0"/>
-              <a:t>stash</a:t>
+              <a:t>, </a:t>
+            </a:r>
+            <a:r>
+              <a:rPr lang="en-US" altLang="ko-KR" dirty="0" err="1"/>
+              <a:t>hdh</a:t>
             </a:r>
             <a:r>
               <a:rPr lang="ko-KR" altLang="en-US" dirty="0"/>
-              <a:t>를 통해 해결할 수 있다</a:t>
+              <a:t> </a:t>
+            </a:r>
+            <a:r>
+              <a:rPr lang="en-US" altLang="ko-KR" dirty="0"/>
+              <a:t>branch</a:t>
+            </a:r>
+            <a:r>
+              <a:rPr lang="ko-KR" altLang="en-US" dirty="0"/>
+              <a:t>에서는 생성된 적도 없는 파일이기 때문에 </a:t>
+            </a:r>
+            <a:r>
+              <a:rPr lang="en-US" altLang="ko-KR" dirty="0"/>
+              <a:t>untracked </a:t>
+            </a:r>
+            <a:r>
+              <a:rPr lang="ko-KR" altLang="en-US" dirty="0"/>
+              <a:t>상태이다</a:t>
             </a:r>
             <a:r>
               <a:rPr lang="en-US" altLang="ko-KR" dirty="0"/>
               <a:t>.</a:t>
             </a:r>
           </a:p>
+          <a:p>
+            <a:pPr algn="ctr"/>
+            <a:r>
+              <a:rPr lang="ko-KR" altLang="en-US" dirty="0"/>
+              <a:t>해당 차이 때문에 </a:t>
+            </a:r>
+            <a:r>
+              <a:rPr lang="en-US" altLang="ko-KR" dirty="0" err="1"/>
+              <a:t>hdh</a:t>
+            </a:r>
+            <a:r>
+              <a:rPr lang="en-US" altLang="ko-KR" dirty="0"/>
+              <a:t> </a:t>
+            </a:r>
+            <a:r>
+              <a:rPr lang="ko-KR" altLang="en-US" dirty="0" err="1"/>
+              <a:t>브랜치로</a:t>
+            </a:r>
+            <a:r>
+              <a:rPr lang="ko-KR" altLang="en-US" dirty="0"/>
+              <a:t> </a:t>
+            </a:r>
+            <a:r>
+              <a:rPr lang="en-US" altLang="ko-KR" dirty="0"/>
+              <a:t>checkout</a:t>
+            </a:r>
+            <a:r>
+              <a:rPr lang="ko-KR" altLang="en-US" dirty="0"/>
+              <a:t>할 수 없다</a:t>
+            </a:r>
+            <a:r>
+              <a:rPr lang="en-US" altLang="ko-KR" dirty="0"/>
+              <a:t>.</a:t>
+            </a:r>
+          </a:p>
         </p:txBody>
       </p:sp>
       <p:pic>
         <p:nvPicPr>
-          <p:cNvPr id="4" name="그림 3">
-            <a:extLst>
-              <a:ext uri="{FF2B5EF4-FFF2-40B4-BE49-F238E27FC236}">
-                <a16:creationId xmlns:a16="http://schemas.microsoft.com/office/drawing/2014/main" id="{7A4EBF40-0A3C-6566-5640-B2507E58BC39}"/>
+          <p:cNvPr id="5" name="그림 4">
+            <a:extLst>
+              <a:ext uri="{FF2B5EF4-FFF2-40B4-BE49-F238E27FC236}">
+                <a16:creationId xmlns:a16="http://schemas.microsoft.com/office/drawing/2014/main" id="{AB48BBC8-8B79-59C8-D289-B720B566EB07}"/>
               </a:ext>
             </a:extLst>
           </p:cNvPr>
@@ -15437,8 +15589,8 @@
         </p:blipFill>
         <p:spPr>
           <a:xfrm>
-            <a:off x="2899144" y="1364594"/>
-            <a:ext cx="6393712" cy="4128812"/>
+            <a:off x="2368358" y="2025578"/>
+            <a:ext cx="7455283" cy="2806844"/>
           </a:xfrm>
           <a:prstGeom prst="rect">
             <a:avLst/>
@@ -15448,7 +15600,7 @@
     </p:spTree>
     <p:extLst>
       <p:ext uri="{BB962C8B-B14F-4D97-AF65-F5344CB8AC3E}">
-        <p14:creationId xmlns:p14="http://schemas.microsoft.com/office/powerpoint/2010/main" val="3376556341"/>
+        <p14:creationId xmlns:p14="http://schemas.microsoft.com/office/powerpoint/2010/main" val="4180734707"/>
       </p:ext>
     </p:extLst>
   </p:cSld>
@@ -15540,8 +15692,8 @@
         </p:nvSpPr>
         <p:spPr>
           <a:xfrm>
-            <a:off x="2219891" y="5632764"/>
-            <a:ext cx="7752443" cy="646331"/>
+            <a:off x="2860281" y="5632764"/>
+            <a:ext cx="6471644" cy="369332"/>
           </a:xfrm>
           <a:prstGeom prst="rect">
             <a:avLst/>
@@ -15557,11 +15709,11 @@
             <a:pPr algn="ctr"/>
             <a:r>
               <a:rPr lang="en-US" altLang="ko-KR" dirty="0"/>
-              <a:t>stash</a:t>
+              <a:t>modified</a:t>
             </a:r>
             <a:r>
               <a:rPr lang="ko-KR" altLang="en-US" dirty="0"/>
-              <a:t>는 아직 </a:t>
+              <a:t> 상태는 </a:t>
             </a:r>
             <a:r>
               <a:rPr lang="en-US" altLang="ko-KR" dirty="0"/>
@@ -15569,65 +15721,29 @@
             </a:r>
             <a:r>
               <a:rPr lang="ko-KR" altLang="en-US" dirty="0"/>
-              <a:t>하기 애매한 파일들을 </a:t>
-            </a:r>
-            <a:r>
-              <a:rPr lang="ko-KR" altLang="en-US" dirty="0" err="1"/>
-              <a:t>임시저장할</a:t>
+              <a:t>하거나 </a:t>
+            </a:r>
+            <a:r>
+              <a:rPr lang="en-US" altLang="ko-KR" dirty="0"/>
+              <a:t>stash</a:t>
             </a:r>
             <a:r>
               <a:rPr lang="ko-KR" altLang="en-US" dirty="0"/>
-              <a:t> 수 있는 기능이다</a:t>
+              <a:t>를 통해 해결할 수 있다</a:t>
             </a:r>
             <a:r>
               <a:rPr lang="en-US" altLang="ko-KR" dirty="0"/>
               <a:t>.</a:t>
             </a:r>
           </a:p>
-          <a:p>
-            <a:pPr algn="ctr"/>
-            <a:r>
-              <a:rPr lang="en-US" altLang="ko-KR" dirty="0"/>
-              <a:t>*</a:t>
-            </a:r>
-            <a:r>
-              <a:rPr lang="ko-KR" altLang="en-US" dirty="0"/>
-              <a:t> </a:t>
-            </a:r>
-            <a:r>
-              <a:rPr lang="en-US" altLang="ko-KR" dirty="0"/>
-              <a:t>“</a:t>
-            </a:r>
-            <a:r>
-              <a:rPr lang="ko-KR" altLang="en-US" dirty="0"/>
-              <a:t>스테이지에 있는 변경사항 유지</a:t>
-            </a:r>
-            <a:r>
-              <a:rPr lang="en-US" altLang="ko-KR" dirty="0"/>
-              <a:t>”</a:t>
-            </a:r>
-            <a:r>
-              <a:rPr lang="ko-KR" altLang="en-US" dirty="0"/>
-              <a:t>는 </a:t>
-            </a:r>
-            <a:r>
-              <a:rPr lang="ko-KR" altLang="en-US" dirty="0" err="1"/>
-              <a:t>확인중</a:t>
-            </a:r>
-            <a:r>
-              <a:rPr lang="ko-KR" altLang="en-US" dirty="0"/>
-              <a:t> </a:t>
-            </a:r>
-            <a:endParaRPr lang="en-US" altLang="ko-KR" dirty="0"/>
-          </a:p>
         </p:txBody>
       </p:sp>
       <p:pic>
         <p:nvPicPr>
-          <p:cNvPr id="3" name="그림 2">
-            <a:extLst>
-              <a:ext uri="{FF2B5EF4-FFF2-40B4-BE49-F238E27FC236}">
-                <a16:creationId xmlns:a16="http://schemas.microsoft.com/office/drawing/2014/main" id="{140D80D3-FE4D-09CA-166E-FAF63A50579C}"/>
+          <p:cNvPr id="4" name="그림 3">
+            <a:extLst>
+              <a:ext uri="{FF2B5EF4-FFF2-40B4-BE49-F238E27FC236}">
+                <a16:creationId xmlns:a16="http://schemas.microsoft.com/office/drawing/2014/main" id="{7A4EBF40-0A3C-6566-5640-B2507E58BC39}"/>
               </a:ext>
             </a:extLst>
           </p:cNvPr>
@@ -15644,8 +15760,8 @@
         </p:blipFill>
         <p:spPr>
           <a:xfrm>
-            <a:off x="3689226" y="1665713"/>
-            <a:ext cx="4813547" cy="2133710"/>
+            <a:off x="2899144" y="1364594"/>
+            <a:ext cx="6393712" cy="4128812"/>
           </a:xfrm>
           <a:prstGeom prst="rect">
             <a:avLst/>
@@ -15655,7 +15771,7 @@
     </p:spTree>
     <p:extLst>
       <p:ext uri="{BB962C8B-B14F-4D97-AF65-F5344CB8AC3E}">
-        <p14:creationId xmlns:p14="http://schemas.microsoft.com/office/powerpoint/2010/main" val="2162072724"/>
+        <p14:creationId xmlns:p14="http://schemas.microsoft.com/office/powerpoint/2010/main" val="3376556341"/>
       </p:ext>
     </p:extLst>
   </p:cSld>
@@ -15747,8 +15863,8 @@
         </p:nvSpPr>
         <p:spPr>
           <a:xfrm>
-            <a:off x="1907319" y="5632764"/>
-            <a:ext cx="8377614" cy="369332"/>
+            <a:off x="2219891" y="5632764"/>
+            <a:ext cx="7752443" cy="646331"/>
           </a:xfrm>
           <a:prstGeom prst="rect">
             <a:avLst/>
@@ -15768,29 +15884,73 @@
             </a:r>
             <a:r>
               <a:rPr lang="ko-KR" altLang="en-US" dirty="0"/>
-              <a:t>를 하게 되면 파일 상태에서 작업내용이 사라지고 </a:t>
+              <a:t>는 아직 </a:t>
+            </a:r>
+            <a:r>
+              <a:rPr lang="en-US" altLang="ko-KR" dirty="0"/>
+              <a:t>commit</a:t>
+            </a:r>
+            <a:r>
+              <a:rPr lang="ko-KR" altLang="en-US" dirty="0"/>
+              <a:t>하기 애매한 파일들을 </a:t>
             </a:r>
             <a:r>
               <a:rPr lang="ko-KR" altLang="en-US" dirty="0" err="1"/>
-              <a:t>스태시</a:t>
+              <a:t>임시저장할</a:t>
             </a:r>
             <a:r>
               <a:rPr lang="ko-KR" altLang="en-US" dirty="0"/>
-              <a:t> 목록에 나타난다</a:t>
+              <a:t> 수 있는 기능이다</a:t>
             </a:r>
             <a:r>
               <a:rPr lang="en-US" altLang="ko-KR" dirty="0"/>
               <a:t>.</a:t>
             </a:r>
           </a:p>
+          <a:p>
+            <a:pPr algn="ctr"/>
+            <a:r>
+              <a:rPr lang="en-US" altLang="ko-KR" dirty="0"/>
+              <a:t>*</a:t>
+            </a:r>
+            <a:r>
+              <a:rPr lang="ko-KR" altLang="en-US" dirty="0"/>
+              <a:t> </a:t>
+            </a:r>
+            <a:r>
+              <a:rPr lang="en-US" altLang="ko-KR" dirty="0"/>
+              <a:t>“</a:t>
+            </a:r>
+            <a:r>
+              <a:rPr lang="ko-KR" altLang="en-US" dirty="0"/>
+              <a:t>스테이지에 있는 변경사항 유지</a:t>
+            </a:r>
+            <a:r>
+              <a:rPr lang="en-US" altLang="ko-KR" dirty="0"/>
+              <a:t>”</a:t>
+            </a:r>
+            <a:r>
+              <a:rPr lang="ko-KR" altLang="en-US" dirty="0"/>
+              <a:t>는 </a:t>
+            </a:r>
+            <a:r>
+              <a:rPr lang="ko-KR" altLang="en-US" dirty="0" err="1"/>
+              <a:t>확인중</a:t>
+            </a:r>
+            <a:r>
+              <a:rPr lang="ko-KR" altLang="en-US" dirty="0"/>
+              <a:t> </a:t>
+            </a:r>
+            <a:endParaRPr lang="en-US" altLang="ko-KR" dirty="0"/>
+          </a:p>
         </p:txBody>
       </p:sp>
       <p:pic>
         <p:nvPicPr>
-          <p:cNvPr id="4" name="그림 3">
-            <a:extLst>
-              <a:ext uri="{FF2B5EF4-FFF2-40B4-BE49-F238E27FC236}">
-                <a16:creationId xmlns:a16="http://schemas.microsoft.com/office/drawing/2014/main" id="{45E0B644-4DFC-BE50-2F52-8803CBD3E5B9}"/>
+          <p:cNvPr id="3" name="그림 2">
+            <a:extLst>
+              <a:ext uri="{FF2B5EF4-FFF2-40B4-BE49-F238E27FC236}">
+                <a16:creationId xmlns:a16="http://schemas.microsoft.com/office/drawing/2014/main" id="{140D80D3-FE4D-09CA-166E-FAF63A50579C}"/>
               </a:ext>
             </a:extLst>
           </p:cNvPr>
@@ -15807,8 +15967,8 @@
         </p:blipFill>
         <p:spPr>
           <a:xfrm>
-            <a:off x="2697125" y="1553629"/>
-            <a:ext cx="6797750" cy="3750742"/>
+            <a:off x="3689226" y="1665713"/>
+            <a:ext cx="4813547" cy="2133710"/>
           </a:xfrm>
           <a:prstGeom prst="rect">
             <a:avLst/>
@@ -15818,7 +15978,7 @@
     </p:spTree>
     <p:extLst>
       <p:ext uri="{BB962C8B-B14F-4D97-AF65-F5344CB8AC3E}">
-        <p14:creationId xmlns:p14="http://schemas.microsoft.com/office/powerpoint/2010/main" val="3414886895"/>
+        <p14:creationId xmlns:p14="http://schemas.microsoft.com/office/powerpoint/2010/main" val="2162072724"/>
       </p:ext>
     </p:extLst>
   </p:cSld>
@@ -15910,6 +16070,169 @@
         </p:nvSpPr>
         <p:spPr>
           <a:xfrm>
+            <a:off x="1907319" y="5632764"/>
+            <a:ext cx="8377614" cy="369332"/>
+          </a:xfrm>
+          <a:prstGeom prst="rect">
+            <a:avLst/>
+          </a:prstGeom>
+          <a:noFill/>
+        </p:spPr>
+        <p:txBody>
+          <a:bodyPr wrap="none" rtlCol="0">
+            <a:spAutoFit/>
+          </a:bodyPr>
+          <a:lstStyle/>
+          <a:p>
+            <a:pPr algn="ctr"/>
+            <a:r>
+              <a:rPr lang="en-US" altLang="ko-KR" dirty="0"/>
+              <a:t>stash</a:t>
+            </a:r>
+            <a:r>
+              <a:rPr lang="ko-KR" altLang="en-US" dirty="0"/>
+              <a:t>를 하게 되면 파일 상태에서 작업내용이 사라지고 </a:t>
+            </a:r>
+            <a:r>
+              <a:rPr lang="ko-KR" altLang="en-US" dirty="0" err="1"/>
+              <a:t>스태시</a:t>
+            </a:r>
+            <a:r>
+              <a:rPr lang="ko-KR" altLang="en-US" dirty="0"/>
+              <a:t> 목록에 나타난다</a:t>
+            </a:r>
+            <a:r>
+              <a:rPr lang="en-US" altLang="ko-KR" dirty="0"/>
+              <a:t>.</a:t>
+            </a:r>
+          </a:p>
+        </p:txBody>
+      </p:sp>
+      <p:pic>
+        <p:nvPicPr>
+          <p:cNvPr id="4" name="그림 3">
+            <a:extLst>
+              <a:ext uri="{FF2B5EF4-FFF2-40B4-BE49-F238E27FC236}">
+                <a16:creationId xmlns:a16="http://schemas.microsoft.com/office/drawing/2014/main" id="{45E0B644-4DFC-BE50-2F52-8803CBD3E5B9}"/>
+              </a:ext>
+            </a:extLst>
+          </p:cNvPr>
+          <p:cNvPicPr>
+            <a:picLocks noChangeAspect="1"/>
+          </p:cNvPicPr>
+          <p:nvPr/>
+        </p:nvPicPr>
+        <p:blipFill>
+          <a:blip r:embed="rId2"/>
+          <a:stretch>
+            <a:fillRect/>
+          </a:stretch>
+        </p:blipFill>
+        <p:spPr>
+          <a:xfrm>
+            <a:off x="2697125" y="1553629"/>
+            <a:ext cx="6797750" cy="3750742"/>
+          </a:xfrm>
+          <a:prstGeom prst="rect">
+            <a:avLst/>
+          </a:prstGeom>
+        </p:spPr>
+      </p:pic>
+    </p:spTree>
+    <p:extLst>
+      <p:ext uri="{BB962C8B-B14F-4D97-AF65-F5344CB8AC3E}">
+        <p14:creationId xmlns:p14="http://schemas.microsoft.com/office/powerpoint/2010/main" val="3414886895"/>
+      </p:ext>
+    </p:extLst>
+  </p:cSld>
+  <p:clrMapOvr>
+    <a:masterClrMapping/>
+  </p:clrMapOvr>
+</p:sld>
+</file>
+
+<file path=ppt/slides/slide46.xml><?xml version="1.0" encoding="utf-8"?>
+<p:sld xmlns:a="http://schemas.openxmlformats.org/drawingml/2006/main" xmlns:r="http://schemas.openxmlformats.org/officeDocument/2006/relationships" xmlns:p="http://schemas.openxmlformats.org/presentationml/2006/main">
+  <p:cSld>
+    <p:spTree>
+      <p:nvGrpSpPr>
+        <p:cNvPr id="1" name=""/>
+        <p:cNvGrpSpPr/>
+        <p:nvPr/>
+      </p:nvGrpSpPr>
+      <p:grpSpPr>
+        <a:xfrm>
+          <a:off x="0" y="0"/>
+          <a:ext cx="0" cy="0"/>
+          <a:chOff x="0" y="0"/>
+          <a:chExt cx="0" cy="0"/>
+        </a:xfrm>
+      </p:grpSpPr>
+      <p:sp>
+        <p:nvSpPr>
+          <p:cNvPr id="6" name="TextBox 5">
+            <a:extLst>
+              <a:ext uri="{FF2B5EF4-FFF2-40B4-BE49-F238E27FC236}">
+                <a16:creationId xmlns:a16="http://schemas.microsoft.com/office/drawing/2014/main" id="{F6147AD3-740E-DA09-22B6-43F39FF02B80}"/>
+              </a:ext>
+            </a:extLst>
+          </p:cNvPr>
+          <p:cNvSpPr txBox="1"/>
+          <p:nvPr/>
+        </p:nvSpPr>
+        <p:spPr>
+          <a:xfrm>
+            <a:off x="3314261" y="270561"/>
+            <a:ext cx="5563511" cy="584775"/>
+          </a:xfrm>
+          <a:prstGeom prst="rect">
+            <a:avLst/>
+          </a:prstGeom>
+          <a:noFill/>
+        </p:spPr>
+        <p:txBody>
+          <a:bodyPr wrap="none" rtlCol="0" anchor="ctr">
+            <a:spAutoFit/>
+          </a:bodyPr>
+          <a:lstStyle/>
+          <a:p>
+            <a:pPr algn="ctr"/>
+            <a:r>
+              <a:rPr lang="en-US" altLang="ko-KR" sz="3200" dirty="0"/>
+              <a:t>[branch checkout conflict</a:t>
+            </a:r>
+            <a:r>
+              <a:rPr lang="ko-KR" altLang="en-US" sz="3200" dirty="0">
+                <a:latin typeface="맑은 고딕" panose="020B0503020000020004" pitchFamily="50" charset="-127"/>
+                <a:ea typeface="맑은 고딕" panose="020B0503020000020004" pitchFamily="50" charset="-127"/>
+              </a:rPr>
+              <a:t> </a:t>
+            </a:r>
+            <a:r>
+              <a:rPr lang="ko-KR" altLang="en-US" sz="3200" dirty="0"/>
+              <a:t>②</a:t>
+            </a:r>
+            <a:r>
+              <a:rPr lang="en-US" altLang="ko-KR" sz="3200" dirty="0"/>
+              <a:t>]</a:t>
+            </a:r>
+          </a:p>
+        </p:txBody>
+      </p:sp>
+      <p:sp>
+        <p:nvSpPr>
+          <p:cNvPr id="13" name="TextBox 12">
+            <a:extLst>
+              <a:ext uri="{FF2B5EF4-FFF2-40B4-BE49-F238E27FC236}">
+                <a16:creationId xmlns:a16="http://schemas.microsoft.com/office/drawing/2014/main" id="{7151BDEC-CC25-7CFB-D7ED-6DC559CFA940}"/>
+              </a:ext>
+            </a:extLst>
+          </p:cNvPr>
+          <p:cNvSpPr txBox="1"/>
+          <p:nvPr/>
+        </p:nvSpPr>
+        <p:spPr>
+          <a:xfrm>
             <a:off x="2716845" y="5632764"/>
             <a:ext cx="6758581" cy="369332"/>
           </a:xfrm>
@@ -15987,7 +16310,7 @@
 </p:sld>
 </file>
 
-<file path=ppt/slides/slide46.xml><?xml version="1.0" encoding="utf-8"?>
+<file path=ppt/slides/slide47.xml><?xml version="1.0" encoding="utf-8"?>
 <p:sld xmlns:a="http://schemas.openxmlformats.org/drawingml/2006/main" xmlns:r="http://schemas.openxmlformats.org/officeDocument/2006/relationships" xmlns:p="http://schemas.openxmlformats.org/presentationml/2006/main">
   <p:cSld>
     <p:spTree>
@@ -16418,7 +16741,7 @@
 </p:sld>
 </file>
 
-<file path=ppt/slides/slide47.xml><?xml version="1.0" encoding="utf-8"?>
+<file path=ppt/slides/slide48.xml><?xml version="1.0" encoding="utf-8"?>
 <p:sld xmlns:a="http://schemas.openxmlformats.org/drawingml/2006/main" xmlns:r="http://schemas.openxmlformats.org/officeDocument/2006/relationships" xmlns:p="http://schemas.openxmlformats.org/presentationml/2006/main">
   <p:cSld>
     <p:spTree>
@@ -17039,7 +17362,7 @@
 </p:sld>
 </file>
 
-<file path=ppt/slides/slide48.xml><?xml version="1.0" encoding="utf-8"?>
+<file path=ppt/slides/slide49.xml><?xml version="1.0" encoding="utf-8"?>
 <p:sld xmlns:a="http://schemas.openxmlformats.org/drawingml/2006/main" xmlns:r="http://schemas.openxmlformats.org/officeDocument/2006/relationships" xmlns:p="http://schemas.openxmlformats.org/presentationml/2006/main">
   <p:cSld>
     <p:spTree>

</xml_diff>